<commit_message>
Add 16F175xx demos and tutorials
</commit_message>
<xml_diff>
--- a/Vendor_Boards/Great_Cow_Basic_Demo_Board/16F17556_chiprange_demonstrations/tutorials/GCBASIC_Part10_EEPROM_ops.pptx
+++ b/Vendor_Boards/Great_Cow_Basic_Demo_Board/16F17556_chiprange_demonstrations/tutorials/GCBASIC_Part10_EEPROM_ops.pptx
@@ -14,19 +14,19 @@
     <p:sldId id="294" r:id="rId2"/>
     <p:sldId id="256" r:id="rId3"/>
     <p:sldId id="295" r:id="rId4"/>
-    <p:sldId id="283" r:id="rId5"/>
-    <p:sldId id="296" r:id="rId6"/>
+    <p:sldId id="342" r:id="rId5"/>
+    <p:sldId id="343" r:id="rId6"/>
     <p:sldId id="282" r:id="rId7"/>
     <p:sldId id="291" r:id="rId8"/>
-    <p:sldId id="285" r:id="rId9"/>
-    <p:sldId id="336" r:id="rId10"/>
+    <p:sldId id="345" r:id="rId9"/>
+    <p:sldId id="346" r:id="rId10"/>
     <p:sldId id="337" r:id="rId11"/>
     <p:sldId id="338" r:id="rId12"/>
     <p:sldId id="339" r:id="rId13"/>
     <p:sldId id="340" r:id="rId14"/>
     <p:sldId id="341" r:id="rId15"/>
     <p:sldId id="288" r:id="rId16"/>
-    <p:sldId id="330" r:id="rId17"/>
+    <p:sldId id="344" r:id="rId17"/>
     <p:sldId id="327" r:id="rId18"/>
   </p:sldIdLst>
   <p:sldSz cx="9144000" cy="5143500" type="screen16x9"/>
@@ -212,7 +212,7 @@
             <a:fld id="{742E545A-AB39-44F0-B5A6-04A90C6C9399}" type="datetimeFigureOut">
               <a:rPr lang="en-GB" smtClean="0"/>
               <a:pPr/>
-              <a:t>24/11/2024</a:t>
+              <a:t>03/12/2025</a:t>
             </a:fld>
             <a:endParaRPr lang="en-GB" dirty="0"/>
           </a:p>
@@ -379,7 +379,7 @@
             <a:fld id="{FF100B3C-2E11-428B-8555-A77018253716}" type="datetimeFigureOut">
               <a:rPr lang="en-GB" smtClean="0"/>
               <a:pPr/>
-              <a:t>24/11/2024</a:t>
+              <a:t>03/12/2025</a:t>
             </a:fld>
             <a:endParaRPr lang="en-GB" dirty="0"/>
           </a:p>
@@ -672,7 +672,7 @@
           <p:cNvPr id="7" name="Rectangle 6">
             <a:extLst>
               <a:ext uri="{FF2B5EF4-FFF2-40B4-BE49-F238E27FC236}">
-                <a16:creationId xmlns="" xmlns:a16="http://schemas.microsoft.com/office/drawing/2014/main" id="{9C757326-0232-4CDF-81FF-302CA676961B}"/>
+                <a16:creationId xmlns:a16="http://schemas.microsoft.com/office/drawing/2014/main" xmlns="" id="{9C757326-0232-4CDF-81FF-302CA676961B}"/>
               </a:ext>
             </a:extLst>
           </p:cNvPr>
@@ -724,7 +724,7 @@
           <p:cNvPr id="8" name="Picture 7">
             <a:extLst>
               <a:ext uri="{FF2B5EF4-FFF2-40B4-BE49-F238E27FC236}">
-                <a16:creationId xmlns="" xmlns:a16="http://schemas.microsoft.com/office/drawing/2014/main" id="{4987E008-68E6-4A43-85BC-1A6ACDF91DE1}"/>
+                <a16:creationId xmlns:a16="http://schemas.microsoft.com/office/drawing/2014/main" xmlns="" id="{4987E008-68E6-4A43-85BC-1A6ACDF91DE1}"/>
               </a:ext>
             </a:extLst>
           </p:cNvPr>
@@ -753,7 +753,7 @@
           <p:cNvPr id="11" name="Picture 10">
             <a:extLst>
               <a:ext uri="{FF2B5EF4-FFF2-40B4-BE49-F238E27FC236}">
-                <a16:creationId xmlns="" xmlns:a16="http://schemas.microsoft.com/office/drawing/2014/main" id="{A1F8C892-C868-4DF6-91AB-B18CE632B10F}"/>
+                <a16:creationId xmlns:a16="http://schemas.microsoft.com/office/drawing/2014/main" xmlns="" id="{A1F8C892-C868-4DF6-91AB-B18CE632B10F}"/>
               </a:ext>
             </a:extLst>
           </p:cNvPr>
@@ -939,7 +939,7 @@
           <p:cNvPr id="12" name="Text Placeholder 2">
             <a:extLst>
               <a:ext uri="{FF2B5EF4-FFF2-40B4-BE49-F238E27FC236}">
-                <a16:creationId xmlns="" xmlns:a16="http://schemas.microsoft.com/office/drawing/2014/main" id="{D547E580-E6D6-4D97-BB04-05795A830147}"/>
+                <a16:creationId xmlns:a16="http://schemas.microsoft.com/office/drawing/2014/main" xmlns="" id="{D547E580-E6D6-4D97-BB04-05795A830147}"/>
               </a:ext>
             </a:extLst>
           </p:cNvPr>
@@ -1092,7 +1092,7 @@
           <p:cNvPr id="9" name="Picture 8">
             <a:extLst>
               <a:ext uri="{FF2B5EF4-FFF2-40B4-BE49-F238E27FC236}">
-                <a16:creationId xmlns="" xmlns:a16="http://schemas.microsoft.com/office/drawing/2014/main" id="{7CE2C968-D10A-4226-8FDC-CBC4C7EDD0B7}"/>
+                <a16:creationId xmlns:a16="http://schemas.microsoft.com/office/drawing/2014/main" xmlns="" id="{7CE2C968-D10A-4226-8FDC-CBC4C7EDD0B7}"/>
               </a:ext>
             </a:extLst>
           </p:cNvPr>
@@ -1294,7 +1294,7 @@
             <a:fld id="{C473AACB-D821-4991-9D88-46EB8D29E619}" type="datetimeFigureOut">
               <a:rPr lang="en-GB" smtClean="0"/>
               <a:pPr/>
-              <a:t>24/11/2024</a:t>
+              <a:t>03/12/2025</a:t>
             </a:fld>
             <a:endParaRPr lang="en-GB" dirty="0"/>
           </a:p>
@@ -1378,7 +1378,7 @@
           <p:cNvPr id="9" name="Picture 8">
             <a:extLst>
               <a:ext uri="{FF2B5EF4-FFF2-40B4-BE49-F238E27FC236}">
-                <a16:creationId xmlns="" xmlns:a16="http://schemas.microsoft.com/office/drawing/2014/main" id="{6AB5D66D-00C1-40EA-BFC8-305566F10369}"/>
+                <a16:creationId xmlns:a16="http://schemas.microsoft.com/office/drawing/2014/main" xmlns="" id="{6AB5D66D-00C1-40EA-BFC8-305566F10369}"/>
               </a:ext>
             </a:extLst>
           </p:cNvPr>
@@ -1588,7 +1588,7 @@
             <a:fld id="{C473AACB-D821-4991-9D88-46EB8D29E619}" type="datetimeFigureOut">
               <a:rPr lang="en-GB" smtClean="0"/>
               <a:pPr/>
-              <a:t>24/11/2024</a:t>
+              <a:t>03/12/2025</a:t>
             </a:fld>
             <a:endParaRPr lang="en-GB" dirty="0"/>
           </a:p>
@@ -1841,7 +1841,7 @@
             <a:fld id="{C473AACB-D821-4991-9D88-46EB8D29E619}" type="datetimeFigureOut">
               <a:rPr lang="en-GB" smtClean="0"/>
               <a:pPr/>
-              <a:t>24/11/2024</a:t>
+              <a:t>03/12/2025</a:t>
             </a:fld>
             <a:endParaRPr lang="en-GB" dirty="0"/>
           </a:p>
@@ -1895,7 +1895,7 @@
           <p:cNvPr id="8" name="Picture 7">
             <a:extLst>
               <a:ext uri="{FF2B5EF4-FFF2-40B4-BE49-F238E27FC236}">
-                <a16:creationId xmlns="" xmlns:a16="http://schemas.microsoft.com/office/drawing/2014/main" id="{AD4D4CB4-D965-4BB6-B218-086244C13BAE}"/>
+                <a16:creationId xmlns:a16="http://schemas.microsoft.com/office/drawing/2014/main" xmlns="" id="{AD4D4CB4-D965-4BB6-B218-086244C13BAE}"/>
               </a:ext>
             </a:extLst>
           </p:cNvPr>
@@ -2186,7 +2186,7 @@
             <a:fld id="{C473AACB-D821-4991-9D88-46EB8D29E619}" type="datetimeFigureOut">
               <a:rPr lang="en-GB" smtClean="0"/>
               <a:pPr/>
-              <a:t>24/11/2024</a:t>
+              <a:t>03/12/2025</a:t>
             </a:fld>
             <a:endParaRPr lang="en-GB" dirty="0"/>
           </a:p>
@@ -2330,7 +2330,7 @@
           <p:cNvPr id="11" name="Picture 10">
             <a:extLst>
               <a:ext uri="{FF2B5EF4-FFF2-40B4-BE49-F238E27FC236}">
-                <a16:creationId xmlns="" xmlns:a16="http://schemas.microsoft.com/office/drawing/2014/main" id="{A3B58C4E-0EF0-466C-9740-EC9F485CBD03}"/>
+                <a16:creationId xmlns:a16="http://schemas.microsoft.com/office/drawing/2014/main" xmlns="" id="{A3B58C4E-0EF0-466C-9740-EC9F485CBD03}"/>
               </a:ext>
             </a:extLst>
           </p:cNvPr>
@@ -2558,7 +2558,7 @@
             <a:fld id="{C473AACB-D821-4991-9D88-46EB8D29E619}" type="datetimeFigureOut">
               <a:rPr lang="en-GB" smtClean="0"/>
               <a:pPr/>
-              <a:t>24/11/2024</a:t>
+              <a:t>03/12/2025</a:t>
             </a:fld>
             <a:endParaRPr lang="en-GB" dirty="0"/>
           </a:p>
@@ -2612,7 +2612,7 @@
           <p:cNvPr id="7" name="Picture 6">
             <a:extLst>
               <a:ext uri="{FF2B5EF4-FFF2-40B4-BE49-F238E27FC236}">
-                <a16:creationId xmlns="" xmlns:a16="http://schemas.microsoft.com/office/drawing/2014/main" id="{2D0B9223-1250-44AA-A6C3-F2013B85AEF3}"/>
+                <a16:creationId xmlns:a16="http://schemas.microsoft.com/office/drawing/2014/main" xmlns="" id="{2D0B9223-1250-44AA-A6C3-F2013B85AEF3}"/>
               </a:ext>
             </a:extLst>
           </p:cNvPr>
@@ -2904,7 +2904,7 @@
             <a:fld id="{C473AACB-D821-4991-9D88-46EB8D29E619}" type="datetimeFigureOut">
               <a:rPr lang="en-GB" smtClean="0"/>
               <a:pPr/>
-              <a:t>24/11/2024</a:t>
+              <a:t>03/12/2025</a:t>
             </a:fld>
             <a:endParaRPr lang="en-GB" dirty="0"/>
           </a:p>
@@ -3040,7 +3040,7 @@
           <p:cNvPr id="11" name="Picture 10">
             <a:extLst>
               <a:ext uri="{FF2B5EF4-FFF2-40B4-BE49-F238E27FC236}">
-                <a16:creationId xmlns="" xmlns:a16="http://schemas.microsoft.com/office/drawing/2014/main" id="{D49E1C7C-7E53-49A2-B2C9-52307876DB7E}"/>
+                <a16:creationId xmlns:a16="http://schemas.microsoft.com/office/drawing/2014/main" xmlns="" id="{D49E1C7C-7E53-49A2-B2C9-52307876DB7E}"/>
               </a:ext>
             </a:extLst>
           </p:cNvPr>
@@ -3328,7 +3328,7 @@
             <a:fld id="{C473AACB-D821-4991-9D88-46EB8D29E619}" type="datetimeFigureOut">
               <a:rPr lang="en-GB" smtClean="0"/>
               <a:pPr/>
-              <a:t>24/11/2024</a:t>
+              <a:t>03/12/2025</a:t>
             </a:fld>
             <a:endParaRPr lang="en-GB" dirty="0"/>
           </a:p>
@@ -3382,7 +3382,7 @@
           <p:cNvPr id="9" name="Picture 8">
             <a:extLst>
               <a:ext uri="{FF2B5EF4-FFF2-40B4-BE49-F238E27FC236}">
-                <a16:creationId xmlns="" xmlns:a16="http://schemas.microsoft.com/office/drawing/2014/main" id="{23082AB0-2BB5-46FE-9A17-15E1ACC06965}"/>
+                <a16:creationId xmlns:a16="http://schemas.microsoft.com/office/drawing/2014/main" xmlns="" id="{23082AB0-2BB5-46FE-9A17-15E1ACC06965}"/>
               </a:ext>
             </a:extLst>
           </p:cNvPr>
@@ -3441,7 +3441,7 @@
           <p:cNvPr id="8" name="Picture 7">
             <a:extLst>
               <a:ext uri="{FF2B5EF4-FFF2-40B4-BE49-F238E27FC236}">
-                <a16:creationId xmlns="" xmlns:a16="http://schemas.microsoft.com/office/drawing/2014/main" id="{1862E859-E5AF-4D76-9FC9-2355B24FF141}"/>
+                <a16:creationId xmlns:a16="http://schemas.microsoft.com/office/drawing/2014/main" xmlns="" id="{1862E859-E5AF-4D76-9FC9-2355B24FF141}"/>
               </a:ext>
             </a:extLst>
           </p:cNvPr>
@@ -3563,7 +3563,7 @@
             <a:fld id="{C473AACB-D821-4991-9D88-46EB8D29E619}" type="datetimeFigureOut">
               <a:rPr lang="en-GB" smtClean="0"/>
               <a:pPr/>
-              <a:t>24/11/2024</a:t>
+              <a:t>03/12/2025</a:t>
             </a:fld>
             <a:endParaRPr lang="en-GB" dirty="0"/>
           </a:p>
@@ -3647,7 +3647,7 @@
           <p:cNvPr id="8" name="Picture 7">
             <a:extLst>
               <a:ext uri="{FF2B5EF4-FFF2-40B4-BE49-F238E27FC236}">
-                <a16:creationId xmlns="" xmlns:a16="http://schemas.microsoft.com/office/drawing/2014/main" id="{91908D0E-7544-4687-965B-72EF64AA4C54}"/>
+                <a16:creationId xmlns:a16="http://schemas.microsoft.com/office/drawing/2014/main" xmlns="" id="{91908D0E-7544-4687-965B-72EF64AA4C54}"/>
               </a:ext>
             </a:extLst>
           </p:cNvPr>
@@ -3774,7 +3774,7 @@
             <a:fld id="{C473AACB-D821-4991-9D88-46EB8D29E619}" type="datetimeFigureOut">
               <a:rPr lang="en-GB" smtClean="0"/>
               <a:pPr/>
-              <a:t>24/11/2024</a:t>
+              <a:t>03/12/2025</a:t>
             </a:fld>
             <a:endParaRPr lang="en-GB" dirty="0"/>
           </a:p>
@@ -3858,7 +3858,7 @@
           <p:cNvPr id="8" name="Picture 7">
             <a:extLst>
               <a:ext uri="{FF2B5EF4-FFF2-40B4-BE49-F238E27FC236}">
-                <a16:creationId xmlns="" xmlns:a16="http://schemas.microsoft.com/office/drawing/2014/main" id="{5B5B8CA2-02D4-408C-B548-182D4F5F54B2}"/>
+                <a16:creationId xmlns:a16="http://schemas.microsoft.com/office/drawing/2014/main" xmlns="" id="{5B5B8CA2-02D4-408C-B548-182D4F5F54B2}"/>
               </a:ext>
             </a:extLst>
           </p:cNvPr>
@@ -3992,7 +3992,7 @@
             <a:fld id="{C473AACB-D821-4991-9D88-46EB8D29E619}" type="datetimeFigureOut">
               <a:rPr lang="en-GB" smtClean="0"/>
               <a:pPr/>
-              <a:t>24/11/2024</a:t>
+              <a:t>03/12/2025</a:t>
             </a:fld>
             <a:endParaRPr lang="en-GB" dirty="0"/>
           </a:p>
@@ -4076,7 +4076,7 @@
           <p:cNvPr id="11" name="Picture 10">
             <a:extLst>
               <a:ext uri="{FF2B5EF4-FFF2-40B4-BE49-F238E27FC236}">
-                <a16:creationId xmlns="" xmlns:a16="http://schemas.microsoft.com/office/drawing/2014/main" id="{EA8DB33B-8BF9-4C99-B31C-55246227EFDE}"/>
+                <a16:creationId xmlns:a16="http://schemas.microsoft.com/office/drawing/2014/main" xmlns="" id="{EA8DB33B-8BF9-4C99-B31C-55246227EFDE}"/>
               </a:ext>
             </a:extLst>
           </p:cNvPr>
@@ -4807,7 +4807,7 @@
             <a:fld id="{C473AACB-D821-4991-9D88-46EB8D29E619}" type="datetimeFigureOut">
               <a:rPr lang="en-GB" smtClean="0"/>
               <a:pPr/>
-              <a:t>24/11/2024</a:t>
+              <a:t>03/12/2025</a:t>
             </a:fld>
             <a:endParaRPr lang="en-GB" dirty="0"/>
           </a:p>
@@ -4891,7 +4891,7 @@
           <p:cNvPr id="11" name="Picture 10">
             <a:extLst>
               <a:ext uri="{FF2B5EF4-FFF2-40B4-BE49-F238E27FC236}">
-                <a16:creationId xmlns="" xmlns:a16="http://schemas.microsoft.com/office/drawing/2014/main" id="{EA8DB33B-8BF9-4C99-B31C-55246227EFDE}"/>
+                <a16:creationId xmlns:a16="http://schemas.microsoft.com/office/drawing/2014/main" xmlns="" id="{EA8DB33B-8BF9-4C99-B31C-55246227EFDE}"/>
               </a:ext>
             </a:extLst>
           </p:cNvPr>
@@ -5621,7 +5621,7 @@
             <a:fld id="{C473AACB-D821-4991-9D88-46EB8D29E619}" type="datetimeFigureOut">
               <a:rPr lang="en-GB" smtClean="0"/>
               <a:pPr/>
-              <a:t>24/11/2024</a:t>
+              <a:t>03/12/2025</a:t>
             </a:fld>
             <a:endParaRPr lang="en-GB" dirty="0"/>
           </a:p>
@@ -5870,7 +5870,7 @@
             <a:fld id="{C473AACB-D821-4991-9D88-46EB8D29E619}" type="datetimeFigureOut">
               <a:rPr lang="en-GB" smtClean="0"/>
               <a:pPr/>
-              <a:t>24/11/2024</a:t>
+              <a:t>03/12/2025</a:t>
             </a:fld>
             <a:endParaRPr lang="en-GB" dirty="0"/>
           </a:p>
@@ -5924,7 +5924,7 @@
           <p:cNvPr id="7" name="Picture 6">
             <a:extLst>
               <a:ext uri="{FF2B5EF4-FFF2-40B4-BE49-F238E27FC236}">
-                <a16:creationId xmlns="" xmlns:a16="http://schemas.microsoft.com/office/drawing/2014/main" id="{6331EFED-43C1-4CBA-8BE3-308E3AA13B9B}"/>
+                <a16:creationId xmlns:a16="http://schemas.microsoft.com/office/drawing/2014/main" xmlns="" id="{6331EFED-43C1-4CBA-8BE3-308E3AA13B9B}"/>
               </a:ext>
             </a:extLst>
           </p:cNvPr>
@@ -6134,7 +6134,7 @@
             <a:fld id="{C473AACB-D821-4991-9D88-46EB8D29E619}" type="datetimeFigureOut">
               <a:rPr lang="en-GB" smtClean="0"/>
               <a:pPr/>
-              <a:t>24/11/2024</a:t>
+              <a:t>03/12/2025</a:t>
             </a:fld>
             <a:endParaRPr lang="en-GB" dirty="0"/>
           </a:p>
@@ -6188,7 +6188,7 @@
           <p:cNvPr id="9" name="Picture 8">
             <a:extLst>
               <a:ext uri="{FF2B5EF4-FFF2-40B4-BE49-F238E27FC236}">
-                <a16:creationId xmlns="" xmlns:a16="http://schemas.microsoft.com/office/drawing/2014/main" id="{1034EA63-4BE3-4A73-A7E6-4A75BE4C1D48}"/>
+                <a16:creationId xmlns:a16="http://schemas.microsoft.com/office/drawing/2014/main" xmlns="" id="{1034EA63-4BE3-4A73-A7E6-4A75BE4C1D48}"/>
               </a:ext>
             </a:extLst>
           </p:cNvPr>
@@ -6247,7 +6247,7 @@
           <p:cNvPr id="10" name="Picture 9">
             <a:extLst>
               <a:ext uri="{FF2B5EF4-FFF2-40B4-BE49-F238E27FC236}">
-                <a16:creationId xmlns="" xmlns:a16="http://schemas.microsoft.com/office/drawing/2014/main" id="{204DC1E6-B5F4-4160-90F3-351FB3242E92}"/>
+                <a16:creationId xmlns:a16="http://schemas.microsoft.com/office/drawing/2014/main" xmlns="" id="{204DC1E6-B5F4-4160-90F3-351FB3242E92}"/>
               </a:ext>
             </a:extLst>
           </p:cNvPr>
@@ -6574,7 +6574,7 @@
             <a:fld id="{C473AACB-D821-4991-9D88-46EB8D29E619}" type="datetimeFigureOut">
               <a:rPr lang="en-GB" smtClean="0"/>
               <a:pPr/>
-              <a:t>24/11/2024</a:t>
+              <a:t>03/12/2025</a:t>
             </a:fld>
             <a:endParaRPr lang="en-GB" dirty="0"/>
           </a:p>
@@ -6658,7 +6658,7 @@
           <p:cNvPr id="6" name="Picture 5">
             <a:extLst>
               <a:ext uri="{FF2B5EF4-FFF2-40B4-BE49-F238E27FC236}">
-                <a16:creationId xmlns="" xmlns:a16="http://schemas.microsoft.com/office/drawing/2014/main" id="{E7897C67-3827-4595-8E3A-71E9F2EAB3AF}"/>
+                <a16:creationId xmlns:a16="http://schemas.microsoft.com/office/drawing/2014/main" xmlns="" id="{E7897C67-3827-4595-8E3A-71E9F2EAB3AF}"/>
               </a:ext>
             </a:extLst>
           </p:cNvPr>
@@ -6729,7 +6729,7 @@
             <a:fld id="{C473AACB-D821-4991-9D88-46EB8D29E619}" type="datetimeFigureOut">
               <a:rPr lang="en-GB" smtClean="0"/>
               <a:pPr/>
-              <a:t>24/11/2024</a:t>
+              <a:t>03/12/2025</a:t>
             </a:fld>
             <a:endParaRPr lang="en-GB" dirty="0"/>
           </a:p>
@@ -6826,7 +6826,7 @@
             <a:fld id="{C473AACB-D821-4991-9D88-46EB8D29E619}" type="datetimeFigureOut">
               <a:rPr lang="en-GB" smtClean="0"/>
               <a:pPr/>
-              <a:t>24/11/2024</a:t>
+              <a:t>03/12/2025</a:t>
             </a:fld>
             <a:endParaRPr lang="en-GB" dirty="0"/>
           </a:p>
@@ -6880,7 +6880,7 @@
           <p:cNvPr id="6" name="Picture 5">
             <a:extLst>
               <a:ext uri="{FF2B5EF4-FFF2-40B4-BE49-F238E27FC236}">
-                <a16:creationId xmlns="" xmlns:a16="http://schemas.microsoft.com/office/drawing/2014/main" id="{F1825398-026A-4668-BB48-C16AD1C9062B}"/>
+                <a16:creationId xmlns:a16="http://schemas.microsoft.com/office/drawing/2014/main" xmlns="" id="{F1825398-026A-4668-BB48-C16AD1C9062B}"/>
               </a:ext>
             </a:extLst>
           </p:cNvPr>
@@ -7603,7 +7603,7 @@
             <a:fld id="{C473AACB-D821-4991-9D88-46EB8D29E619}" type="datetimeFigureOut">
               <a:rPr lang="en-GB" smtClean="0"/>
               <a:pPr/>
-              <a:t>24/11/2024</a:t>
+              <a:t>03/12/2025</a:t>
             </a:fld>
             <a:endParaRPr lang="en-GB" dirty="0"/>
           </a:p>
@@ -8177,8 +8177,9 @@
           <a:p>
             <a:r>
               <a:rPr lang="en-GB" dirty="0" smtClean="0"/>
-              <a:t>PIC18FxxQ24</a:t>
-            </a:r>
+              <a:t>PIC16F175xx</a:t>
+            </a:r>
+            <a:endParaRPr lang="en-GB" dirty="0" smtClean="0"/>
           </a:p>
           <a:p>
             <a:r>
@@ -8259,7 +8260,7 @@
         <p:spPr>
           <a:xfrm>
             <a:off x="179512" y="1491630"/>
-            <a:ext cx="5256584" cy="2749471"/>
+            <a:ext cx="3600400" cy="2749471"/>
           </a:xfrm>
           <a:prstGeom prst="rect">
             <a:avLst/>
@@ -8471,8 +8472,8 @@
           </a:lstStyle>
           <a:p>
             <a:r>
-              <a:rPr lang="en-GB" dirty="0"/>
-              <a:t>64 </a:t>
+              <a:rPr lang="en-GB" dirty="0" smtClean="0"/>
+              <a:t>16 </a:t>
             </a:r>
             <a:r>
               <a:rPr lang="en-GB" dirty="0"/>
@@ -8482,52 +8483,35 @@
           <a:p>
             <a:r>
               <a:rPr lang="en-GB" dirty="0"/>
-              <a:t>4 </a:t>
-            </a:r>
+              <a:t>4 KB of Data SRAM Memory</a:t>
+            </a:r>
+          </a:p>
+          <a:p>
+            <a:r>
+              <a:rPr lang="en-GB" b="1" dirty="0" smtClean="0"/>
+              <a:t>256 Bytes </a:t>
+            </a:r>
+            <a:r>
+              <a:rPr lang="en-GB" b="1" dirty="0"/>
+              <a:t>Data EEPROM</a:t>
+            </a:r>
+          </a:p>
+          <a:p>
+            <a:endParaRPr lang="en-GB" dirty="0"/>
+          </a:p>
+          <a:p>
             <a:r>
               <a:rPr lang="en-GB" dirty="0"/>
-              <a:t>KB of Data SRAM </a:t>
+              <a:t>Memory Access Partition, the Program Flash Memory </a:t>
+            </a:r>
+            <a:r>
+              <a:rPr lang="en-GB" dirty="0" smtClean="0"/>
+              <a:t>Partitioned </a:t>
             </a:r>
             <a:r>
               <a:rPr lang="en-GB" dirty="0"/>
-              <a:t>Memory</a:t>
-            </a:r>
-          </a:p>
-          <a:p>
-            <a:r>
-              <a:rPr lang="en-GB" b="1" dirty="0" smtClean="0"/>
-              <a:t>512 </a:t>
-            </a:r>
-            <a:r>
-              <a:rPr lang="en-GB" b="1" dirty="0"/>
-              <a:t>Bytes Data </a:t>
-            </a:r>
-            <a:r>
-              <a:rPr lang="en-GB" b="1" dirty="0"/>
-              <a:t>EEPROM</a:t>
-            </a:r>
-          </a:p>
-          <a:p>
-            <a:endParaRPr lang="en-GB" dirty="0"/>
-          </a:p>
-          <a:p>
-            <a:r>
-              <a:rPr lang="en-GB" dirty="0"/>
-              <a:t>Memory </a:t>
-            </a:r>
-            <a:r>
-              <a:rPr lang="en-GB" dirty="0"/>
-              <a:t>Access </a:t>
-            </a:r>
-            <a:r>
-              <a:rPr lang="en-GB" dirty="0"/>
-              <a:t>Partition, the </a:t>
-            </a:r>
-            <a:r>
-              <a:rPr lang="en-GB" dirty="0"/>
-              <a:t>Program Flash Memory Can Be Partitioned into: </a:t>
-            </a:r>
-            <a:endParaRPr lang="en-GB" dirty="0"/>
+              <a:t>into: </a:t>
+            </a:r>
           </a:p>
           <a:p>
             <a:pPr lvl="1"/>
@@ -8539,7 +8523,6 @@
               <a:rPr lang="en-GB" dirty="0"/>
               <a:t>Block </a:t>
             </a:r>
-            <a:endParaRPr lang="en-GB" dirty="0"/>
           </a:p>
           <a:p>
             <a:pPr lvl="1"/>
@@ -8551,7 +8534,6 @@
               <a:rPr lang="en-GB" dirty="0"/>
               <a:t>Block </a:t>
             </a:r>
-            <a:endParaRPr lang="en-GB" dirty="0"/>
           </a:p>
           <a:p>
             <a:pPr lvl="1"/>
@@ -8568,7 +8550,7 @@
       </p:sp>
       <p:pic>
         <p:nvPicPr>
-          <p:cNvPr id="1026" name="Picture 2"/>
+          <p:cNvPr id="1027" name="Picture 3"/>
           <p:cNvPicPr>
             <a:picLocks noChangeAspect="1" noChangeArrowheads="1"/>
           </p:cNvPicPr>
@@ -8589,8 +8571,8 @@
         </p:blipFill>
         <p:spPr bwMode="auto">
           <a:xfrm>
-            <a:off x="5508104" y="771550"/>
-            <a:ext cx="3384042" cy="4299942"/>
+            <a:off x="3679830" y="1419622"/>
+            <a:ext cx="5464546" cy="2160240"/>
           </a:xfrm>
           <a:prstGeom prst="rect">
             <a:avLst/>
@@ -8630,6 +8612,52 @@
           </a:extLst>
         </p:spPr>
       </p:pic>
+      <p:sp>
+        <p:nvSpPr>
+          <p:cNvPr id="4" name="Rectangle 3"/>
+          <p:cNvSpPr/>
+          <p:nvPr/>
+        </p:nvSpPr>
+        <p:spPr>
+          <a:xfrm>
+            <a:off x="6732240" y="3291830"/>
+            <a:ext cx="1008112" cy="288032"/>
+          </a:xfrm>
+          <a:prstGeom prst="rect">
+            <a:avLst/>
+          </a:prstGeom>
+          <a:noFill/>
+          <a:ln>
+            <a:solidFill>
+              <a:srgbClr val="FF0000"/>
+            </a:solidFill>
+          </a:ln>
+        </p:spPr>
+        <p:style>
+          <a:lnRef idx="2">
+            <a:schemeClr val="accent1">
+              <a:shade val="50000"/>
+            </a:schemeClr>
+          </a:lnRef>
+          <a:fillRef idx="1">
+            <a:schemeClr val="accent1"/>
+          </a:fillRef>
+          <a:effectRef idx="0">
+            <a:schemeClr val="accent1"/>
+          </a:effectRef>
+          <a:fontRef idx="minor">
+            <a:schemeClr val="lt1"/>
+          </a:fontRef>
+        </p:style>
+        <p:txBody>
+          <a:bodyPr rtlCol="0" anchor="ctr"/>
+          <a:lstStyle/>
+          <a:p>
+            <a:pPr algn="ctr"/>
+            <a:endParaRPr lang="en-GB"/>
+          </a:p>
+        </p:txBody>
+      </p:sp>
     </p:spTree>
     <p:extLst>
       <p:ext uri="{BB962C8B-B14F-4D97-AF65-F5344CB8AC3E}">
@@ -8640,11 +8668,11 @@
   <p:clrMapOvr>
     <a:masterClrMapping/>
   </p:clrMapOvr>
-  <mc:AlternateContent xmlns:mc="http://schemas.openxmlformats.org/markup-compatibility/2006">
-    <mc:Choice xmlns:p14="http://schemas.microsoft.com/office/powerpoint/2010/main" Requires="p14">
+  <mc:AlternateContent xmlns:mc="http://schemas.openxmlformats.org/markup-compatibility/2006" xmlns:p14="http://schemas.microsoft.com/office/powerpoint/2010/main">
+    <mc:Choice Requires="p14">
       <p:transition spd="slow" p14:dur="2000" advClick="0"/>
     </mc:Choice>
-    <mc:Fallback>
+    <mc:Fallback xmlns="">
       <p:transition spd="slow" advClick="0"/>
     </mc:Fallback>
   </mc:AlternateContent>
@@ -8675,68 +8703,6 @@
           <a:chExt cx="0" cy="0"/>
         </a:xfrm>
       </p:grpSpPr>
-      <p:pic>
-        <p:nvPicPr>
-          <p:cNvPr id="8" name="Picture 2"/>
-          <p:cNvPicPr>
-            <a:picLocks noChangeAspect="1" noChangeArrowheads="1"/>
-          </p:cNvPicPr>
-          <p:nvPr/>
-        </p:nvPicPr>
-        <p:blipFill rotWithShape="1">
-          <a:blip r:embed="rId2">
-            <a:extLst>
-              <a:ext uri="{28A0092B-C50C-407E-A947-70E740481C1C}">
-                <a14:useLocalDpi xmlns:a14="http://schemas.microsoft.com/office/drawing/2010/main" val="0"/>
-              </a:ext>
-            </a:extLst>
-          </a:blip>
-          <a:srcRect l="20552"/>
-          <a:stretch/>
-        </p:blipFill>
-        <p:spPr bwMode="auto">
-          <a:xfrm>
-            <a:off x="3248526" y="-3689233"/>
-            <a:ext cx="6436042" cy="10293431"/>
-          </a:xfrm>
-          <a:prstGeom prst="rect">
-            <a:avLst/>
-          </a:prstGeom>
-          <a:noFill/>
-          <a:ln>
-            <a:noFill/>
-          </a:ln>
-          <a:effectLst/>
-          <a:extLst>
-            <a:ext uri="{909E8E84-426E-40DD-AFC4-6F175D3DCCD1}">
-              <a14:hiddenFill xmlns:a14="http://schemas.microsoft.com/office/drawing/2010/main">
-                <a:solidFill>
-                  <a:schemeClr val="accent1"/>
-                </a:solidFill>
-              </a14:hiddenFill>
-            </a:ext>
-            <a:ext uri="{91240B29-F687-4F45-9708-019B960494DF}">
-              <a14:hiddenLine xmlns:a14="http://schemas.microsoft.com/office/drawing/2010/main" w="9525">
-                <a:solidFill>
-                  <a:schemeClr val="tx1"/>
-                </a:solidFill>
-                <a:miter lim="800000"/>
-                <a:headEnd/>
-                <a:tailEnd/>
-              </a14:hiddenLine>
-            </a:ext>
-            <a:ext uri="{AF507438-7753-43E0-B8FC-AC1667EBCBE1}">
-              <a14:hiddenEffects xmlns:a14="http://schemas.microsoft.com/office/drawing/2010/main">
-                <a:effectLst>
-                  <a:outerShdw dist="35921" dir="2700000" algn="ctr" rotWithShape="0">
-                    <a:schemeClr val="bg2"/>
-                  </a:outerShdw>
-                </a:effectLst>
-              </a14:hiddenEffects>
-            </a:ext>
-          </a:extLst>
-        </p:spPr>
-      </p:pic>
       <p:sp>
         <p:nvSpPr>
           <p:cNvPr id="5" name="Title 1"/>
@@ -8841,60 +8807,14 @@
       </p:sp>
       <p:sp>
         <p:nvSpPr>
-          <p:cNvPr id="4" name="Rectangle 3"/>
-          <p:cNvSpPr/>
-          <p:nvPr/>
-        </p:nvSpPr>
-        <p:spPr>
-          <a:xfrm>
-            <a:off x="3131840" y="2643758"/>
-            <a:ext cx="6480720" cy="576064"/>
-          </a:xfrm>
-          <a:prstGeom prst="rect">
-            <a:avLst/>
-          </a:prstGeom>
-          <a:noFill/>
-          <a:ln w="28575">
-            <a:solidFill>
-              <a:srgbClr val="FF0000"/>
-            </a:solidFill>
-          </a:ln>
-        </p:spPr>
-        <p:style>
-          <a:lnRef idx="2">
-            <a:schemeClr val="accent1">
-              <a:shade val="50000"/>
-            </a:schemeClr>
-          </a:lnRef>
-          <a:fillRef idx="1">
-            <a:schemeClr val="accent1"/>
-          </a:fillRef>
-          <a:effectRef idx="0">
-            <a:schemeClr val="accent1"/>
-          </a:effectRef>
-          <a:fontRef idx="minor">
-            <a:schemeClr val="lt1"/>
-          </a:fontRef>
-        </p:style>
-        <p:txBody>
-          <a:bodyPr rtlCol="0" anchor="ctr"/>
-          <a:lstStyle/>
-          <a:p>
-            <a:pPr algn="ctr"/>
-            <a:endParaRPr lang="en-GB"/>
-          </a:p>
-        </p:txBody>
-      </p:sp>
-      <p:sp>
-        <p:nvSpPr>
           <p:cNvPr id="7" name="TextBox 6"/>
           <p:cNvSpPr txBox="1"/>
           <p:nvPr/>
         </p:nvSpPr>
         <p:spPr>
           <a:xfrm>
-            <a:off x="107504" y="1637094"/>
-            <a:ext cx="2952328" cy="2021066"/>
+            <a:off x="467544" y="2067694"/>
+            <a:ext cx="5040560" cy="2021066"/>
           </a:xfrm>
           <a:prstGeom prst="rect">
             <a:avLst/>
@@ -9121,7 +9041,6 @@
               <a:rPr lang="en-GB" dirty="0"/>
               <a:t>Non-volatile memory to store relatively small amounts of data but allowing individual bytes to be erased and reprogrammed.</a:t>
             </a:r>
-            <a:endParaRPr lang="en-GB" dirty="0"/>
           </a:p>
         </p:txBody>
       </p:sp>
@@ -9135,11 +9054,11 @@
   <p:clrMapOvr>
     <a:masterClrMapping/>
   </p:clrMapOvr>
-  <mc:AlternateContent xmlns:mc="http://schemas.openxmlformats.org/markup-compatibility/2006">
-    <mc:Choice xmlns:p14="http://schemas.microsoft.com/office/powerpoint/2010/main" Requires="p14">
+  <mc:AlternateContent xmlns:mc="http://schemas.openxmlformats.org/markup-compatibility/2006" xmlns:p14="http://schemas.microsoft.com/office/powerpoint/2010/main">
+    <mc:Choice Requires="p14">
       <p:transition spd="slow" p14:dur="2000" advClick="0"/>
     </mc:Choice>
-    <mc:Fallback>
+    <mc:Fallback xmlns="">
       <p:transition spd="slow" advClick="0"/>
     </mc:Fallback>
   </mc:AlternateContent>
@@ -9234,21 +9153,7 @@
                 <a:latin typeface="Courier New" pitchFamily="49" charset="0"/>
                 <a:cs typeface="Courier New" pitchFamily="49" charset="0"/>
               </a:rPr>
-              <a:t>	</a:t>
-            </a:r>
-            <a:r>
-              <a:rPr lang="en-GB" sz="1400" dirty="0" smtClean="0">
-                <a:latin typeface="Courier New" pitchFamily="49" charset="0"/>
-                <a:cs typeface="Courier New" pitchFamily="49" charset="0"/>
-              </a:rPr>
-              <a:t>Value          </a:t>
-            </a:r>
-            <a:r>
-              <a:rPr lang="en-GB" sz="1400" dirty="0" smtClean="0">
-                <a:latin typeface="Courier New" pitchFamily="49" charset="0"/>
-                <a:cs typeface="Courier New" pitchFamily="49" charset="0"/>
-              </a:rPr>
-              <a:t>Explanation</a:t>
+              <a:t>	Value          Explanation</a:t>
             </a:r>
           </a:p>
           <a:p>
@@ -9273,11 +9178,11 @@
               <a:t>            </a:t>
             </a:r>
             <a:r>
-              <a:rPr lang="en-GB" sz="1400" dirty="0" smtClean="0">
+              <a:rPr lang="en-GB" sz="1400" dirty="0">
                 <a:latin typeface="Courier New" pitchFamily="49" charset="0"/>
                 <a:cs typeface="Courier New" pitchFamily="49" charset="0"/>
               </a:rPr>
-              <a:t>32768          </a:t>
+              <a:t>16384          </a:t>
             </a:r>
             <a:r>
               <a:rPr lang="en-GB" sz="1400" dirty="0" err="1" smtClean="0">
@@ -9339,14 +9244,7 @@
                 <a:latin typeface="Courier New" pitchFamily="49" charset="0"/>
                 <a:cs typeface="Courier New" pitchFamily="49" charset="0"/>
               </a:rPr>
-              <a:t>	</a:t>
-            </a:r>
-            <a:r>
-              <a:rPr lang="en-GB" sz="1400" dirty="0" smtClean="0">
-                <a:latin typeface="Courier New" pitchFamily="49" charset="0"/>
-                <a:cs typeface="Courier New" pitchFamily="49" charset="0"/>
-              </a:rPr>
-              <a:t>128            </a:t>
+              <a:t>	128            </a:t>
             </a:r>
             <a:r>
               <a:rPr lang="en-GB" sz="1400" dirty="0" err="1">
@@ -9422,28 +9320,14 @@
                 <a:latin typeface="Courier New" pitchFamily="49" charset="0"/>
                 <a:cs typeface="Courier New" pitchFamily="49" charset="0"/>
               </a:rPr>
-              <a:t>512</a:t>
+              <a:t>256            </a:t>
             </a:r>
             <a:r>
               <a:rPr lang="en-GB" sz="1400" b="1" dirty="0" smtClean="0">
                 <a:latin typeface="Courier New" pitchFamily="49" charset="0"/>
                 <a:cs typeface="Courier New" pitchFamily="49" charset="0"/>
               </a:rPr>
-              <a:t>            </a:t>
-            </a:r>
-            <a:r>
-              <a:rPr lang="en-GB" sz="1400" b="1" dirty="0" smtClean="0">
-                <a:latin typeface="Courier New" pitchFamily="49" charset="0"/>
-                <a:cs typeface="Courier New" pitchFamily="49" charset="0"/>
-              </a:rPr>
-              <a:t>EEPROM is exposed as </a:t>
-            </a:r>
-            <a:r>
-              <a:rPr lang="en-GB" sz="1400" b="1" dirty="0" smtClean="0">
-                <a:latin typeface="Courier New" pitchFamily="49" charset="0"/>
-                <a:cs typeface="Courier New" pitchFamily="49" charset="0"/>
-              </a:rPr>
-              <a:t> </a:t>
+              <a:t>EEPROM is exposed as  </a:t>
             </a:r>
             <a:r>
               <a:rPr lang="en-GB" sz="1400" b="1" dirty="0" err="1" smtClean="0">
@@ -9470,21 +9354,14 @@
                 <a:latin typeface="Courier New" pitchFamily="49" charset="0"/>
                 <a:cs typeface="Courier New" pitchFamily="49" charset="0"/>
               </a:rPr>
-              <a:t>4096           </a:t>
+              <a:t>2048           </a:t>
             </a:r>
             <a:r>
               <a:rPr lang="en-GB" sz="1400" dirty="0" smtClean="0">
                 <a:latin typeface="Courier New" pitchFamily="49" charset="0"/>
                 <a:cs typeface="Courier New" pitchFamily="49" charset="0"/>
               </a:rPr>
-              <a:t>RAM is exposed as </a:t>
-            </a:r>
-            <a:r>
-              <a:rPr lang="en-GB" sz="1400" dirty="0" smtClean="0">
-                <a:latin typeface="Courier New" pitchFamily="49" charset="0"/>
-                <a:cs typeface="Courier New" pitchFamily="49" charset="0"/>
-              </a:rPr>
-              <a:t>    </a:t>
+              <a:t>RAM is exposed as     </a:t>
             </a:r>
             <a:r>
               <a:rPr lang="en-GB" sz="1400" dirty="0" err="1" smtClean="0">
@@ -9510,11 +9387,11 @@
   <p:clrMapOvr>
     <a:masterClrMapping/>
   </p:clrMapOvr>
-  <mc:AlternateContent xmlns:mc="http://schemas.openxmlformats.org/markup-compatibility/2006">
-    <mc:Choice xmlns:p14="http://schemas.microsoft.com/office/powerpoint/2010/main" Requires="p14">
+  <mc:AlternateContent xmlns:mc="http://schemas.openxmlformats.org/markup-compatibility/2006" xmlns:p14="http://schemas.microsoft.com/office/powerpoint/2010/main">
+    <mc:Choice Requires="p14">
       <p:transition spd="slow" p14:dur="2000" advClick="0"/>
     </mc:Choice>
-    <mc:Fallback>
+    <mc:Fallback xmlns="">
       <p:transition spd="slow" advClick="0"/>
     </mc:Fallback>
   </mc:AlternateContent>
@@ -9569,15 +9446,7 @@
             </a:r>
             <a:r>
               <a:rPr lang="en-GB" dirty="0" smtClean="0"/>
-              <a:t> – </a:t>
-            </a:r>
-            <a:r>
-              <a:rPr lang="en-GB" dirty="0" smtClean="0"/>
-              <a:t>3 </a:t>
-            </a:r>
-            <a:r>
-              <a:rPr lang="en-GB" dirty="0" smtClean="0"/>
-              <a:t>ways</a:t>
+              <a:t> – 3 ways</a:t>
             </a:r>
             <a:endParaRPr lang="en-GB" dirty="0"/>
           </a:p>
@@ -9872,11 +9741,11 @@
   <p:clrMapOvr>
     <a:masterClrMapping/>
   </p:clrMapOvr>
-  <mc:AlternateContent xmlns:mc="http://schemas.openxmlformats.org/markup-compatibility/2006">
-    <mc:Choice xmlns:p14="http://schemas.microsoft.com/office/powerpoint/2010/main" Requires="p14">
+  <mc:AlternateContent xmlns:mc="http://schemas.openxmlformats.org/markup-compatibility/2006" xmlns:p14="http://schemas.microsoft.com/office/powerpoint/2010/main">
+    <mc:Choice Requires="p14">
       <p:transition spd="slow" p14:dur="2000" advClick="0"/>
     </mc:Choice>
-    <mc:Fallback>
+    <mc:Fallback xmlns="">
       <p:transition spd="slow" advClick="0"/>
     </mc:Fallback>
   </mc:AlternateContent>
@@ -10076,11 +9945,11 @@
   <p:clrMapOvr>
     <a:masterClrMapping/>
   </p:clrMapOvr>
-  <mc:AlternateContent xmlns:mc="http://schemas.openxmlformats.org/markup-compatibility/2006">
-    <mc:Choice xmlns:p14="http://schemas.microsoft.com/office/powerpoint/2010/main" Requires="p14">
+  <mc:AlternateContent xmlns:mc="http://schemas.openxmlformats.org/markup-compatibility/2006" xmlns:p14="http://schemas.microsoft.com/office/powerpoint/2010/main">
+    <mc:Choice Requires="p14">
       <p:transition spd="slow" p14:dur="2000" advClick="0"/>
     </mc:Choice>
-    <mc:Fallback>
+    <mc:Fallback xmlns="">
       <p:transition spd="slow" advClick="0"/>
     </mc:Fallback>
   </mc:AlternateContent>
@@ -10351,10 +10220,25 @@
               <a:buAutoNum type="arabicPeriod"/>
             </a:pPr>
             <a:r>
+              <a:rPr lang="en-GB" sz="1100" dirty="0"/>
+              <a:t>Using the </a:t>
+            </a:r>
+            <a:r>
               <a:rPr lang="en-GB" sz="1100" dirty="0" smtClean="0"/>
-              <a:t>Using the timer0 overflow, 8bit timer, 16bit timer to flash the LEDs</a:t>
-            </a:r>
-            <a:endParaRPr lang="en-GB" sz="1100" dirty="0"/>
+              <a:t>timer0:  16bit timer, 8bit </a:t>
+            </a:r>
+            <a:r>
+              <a:rPr lang="en-GB" sz="1100" dirty="0"/>
+              <a:t>timer and overflow </a:t>
+            </a:r>
+            <a:r>
+              <a:rPr lang="en-GB" sz="1100" dirty="0" smtClean="0"/>
+              <a:t> to </a:t>
+            </a:r>
+            <a:r>
+              <a:rPr lang="en-GB" sz="1100" dirty="0"/>
+              <a:t>flash the LEDs</a:t>
+            </a:r>
           </a:p>
           <a:p>
             <a:pPr marL="180000" indent="-478483">
@@ -10418,7 +10302,15 @@
             </a:pPr>
             <a:r>
               <a:rPr lang="en-GB" sz="1100" dirty="0"/>
-              <a:t>Using PWM, 7  ways,  to dim the LEDS</a:t>
+              <a:t>Using PWM, </a:t>
+            </a:r>
+            <a:r>
+              <a:rPr lang="en-GB" sz="1100" dirty="0" smtClean="0"/>
+              <a:t>many </a:t>
+            </a:r>
+            <a:r>
+              <a:rPr lang="en-GB" sz="1100" dirty="0"/>
+              <a:t>ways,  to dim the LEDS</a:t>
             </a:r>
           </a:p>
           <a:p>
@@ -10579,7 +10471,7 @@
     </p:spTree>
     <p:extLst>
       <p:ext uri="{BB962C8B-B14F-4D97-AF65-F5344CB8AC3E}">
-        <p14:creationId xmlns:p14="http://schemas.microsoft.com/office/powerpoint/2010/main" val="1074978209"/>
+        <p14:creationId xmlns:p14="http://schemas.microsoft.com/office/powerpoint/2010/main" val="1421416510"/>
       </p:ext>
     </p:extLst>
   </p:cSld>
@@ -10943,8 +10835,9 @@
           <a:p>
             <a:r>
               <a:rPr lang="en-GB" dirty="0" smtClean="0"/>
-              <a:t>PIC18FxxQ24</a:t>
-            </a:r>
+              <a:t>PIC16F175xx</a:t>
+            </a:r>
+            <a:endParaRPr lang="en-GB" dirty="0" smtClean="0"/>
           </a:p>
           <a:p>
             <a:r>
@@ -10957,7 +10850,7 @@
       </p:sp>
       <p:pic>
         <p:nvPicPr>
-          <p:cNvPr id="10" name="Picture 2" descr="PIC18F26Q24"/>
+          <p:cNvPr id="7" name="Picture 4" descr="PIC16F17556 | Microchip Technology"/>
           <p:cNvPicPr>
             <a:picLocks noChangeAspect="1" noChangeArrowheads="1"/>
           </p:cNvPicPr>
@@ -10978,8 +10871,49 @@
         </p:blipFill>
         <p:spPr bwMode="auto">
           <a:xfrm>
-            <a:off x="1907705" y="4116163"/>
-            <a:ext cx="1280738" cy="922132"/>
+            <a:off x="6750880" y="3974993"/>
+            <a:ext cx="2415427" cy="1178257"/>
+          </a:xfrm>
+          <a:prstGeom prst="rect">
+            <a:avLst/>
+          </a:prstGeom>
+          <a:noFill/>
+          <a:extLst>
+            <a:ext uri="{909E8E84-426E-40DD-AFC4-6F175D3DCCD1}">
+              <a14:hiddenFill xmlns:a14="http://schemas.microsoft.com/office/drawing/2010/main">
+                <a:solidFill>
+                  <a:srgbClr val="FFFFFF"/>
+                </a:solidFill>
+              </a14:hiddenFill>
+            </a:ext>
+          </a:extLst>
+        </p:spPr>
+      </p:pic>
+      <p:pic>
+        <p:nvPicPr>
+          <p:cNvPr id="9" name="Picture 8" descr="VQFN / 28"/>
+          <p:cNvPicPr>
+            <a:picLocks noChangeAspect="1" noChangeArrowheads="1"/>
+          </p:cNvPicPr>
+          <p:nvPr/>
+        </p:nvPicPr>
+        <p:blipFill>
+          <a:blip r:embed="rId4">
+            <a:extLst>
+              <a:ext uri="{28A0092B-C50C-407E-A947-70E740481C1C}">
+                <a14:useLocalDpi xmlns:a14="http://schemas.microsoft.com/office/drawing/2010/main" val="0"/>
+              </a:ext>
+            </a:extLst>
+          </a:blip>
+          <a:srcRect/>
+          <a:stretch>
+            <a:fillRect/>
+          </a:stretch>
+        </p:blipFill>
+        <p:spPr bwMode="auto">
+          <a:xfrm>
+            <a:off x="2555776" y="4127004"/>
+            <a:ext cx="1142256" cy="1026246"/>
           </a:xfrm>
           <a:prstGeom prst="rect">
             <a:avLst/>
@@ -11363,8 +11297,9 @@
           <a:p>
             <a:r>
               <a:rPr lang="en-GB" dirty="0" smtClean="0"/>
-              <a:t>PIC18FxxQ24</a:t>
-            </a:r>
+              <a:t>PIC16F175xx</a:t>
+            </a:r>
+            <a:endParaRPr lang="en-GB" dirty="0" smtClean="0"/>
           </a:p>
           <a:p>
             <a:r>
@@ -11377,7 +11312,7 @@
       </p:sp>
       <p:pic>
         <p:nvPicPr>
-          <p:cNvPr id="10" name="Picture 2" descr="PIC18F26Q24"/>
+          <p:cNvPr id="7" name="Picture 4" descr="PIC16F17556 | Microchip Technology"/>
           <p:cNvPicPr>
             <a:picLocks noChangeAspect="1" noChangeArrowheads="1"/>
           </p:cNvPicPr>
@@ -11398,8 +11333,49 @@
         </p:blipFill>
         <p:spPr bwMode="auto">
           <a:xfrm>
-            <a:off x="1907705" y="4116163"/>
-            <a:ext cx="1280738" cy="922132"/>
+            <a:off x="6750880" y="3974993"/>
+            <a:ext cx="2415427" cy="1178257"/>
+          </a:xfrm>
+          <a:prstGeom prst="rect">
+            <a:avLst/>
+          </a:prstGeom>
+          <a:noFill/>
+          <a:extLst>
+            <a:ext uri="{909E8E84-426E-40DD-AFC4-6F175D3DCCD1}">
+              <a14:hiddenFill xmlns:a14="http://schemas.microsoft.com/office/drawing/2010/main">
+                <a:solidFill>
+                  <a:srgbClr val="FFFFFF"/>
+                </a:solidFill>
+              </a14:hiddenFill>
+            </a:ext>
+          </a:extLst>
+        </p:spPr>
+      </p:pic>
+      <p:pic>
+        <p:nvPicPr>
+          <p:cNvPr id="9" name="Picture 8" descr="VQFN / 28"/>
+          <p:cNvPicPr>
+            <a:picLocks noChangeAspect="1" noChangeArrowheads="1"/>
+          </p:cNvPicPr>
+          <p:nvPr/>
+        </p:nvPicPr>
+        <p:blipFill>
+          <a:blip r:embed="rId4">
+            <a:extLst>
+              <a:ext uri="{28A0092B-C50C-407E-A947-70E740481C1C}">
+                <a14:useLocalDpi xmlns:a14="http://schemas.microsoft.com/office/drawing/2010/main" val="0"/>
+              </a:ext>
+            </a:extLst>
+          </a:blip>
+          <a:srcRect/>
+          <a:stretch>
+            <a:fillRect/>
+          </a:stretch>
+        </p:blipFill>
+        <p:spPr bwMode="auto">
+          <a:xfrm>
+            <a:off x="2555776" y="4127004"/>
+            <a:ext cx="1142256" cy="1026246"/>
           </a:xfrm>
           <a:prstGeom prst="rect">
             <a:avLst/>
@@ -11612,9 +11588,38 @@
           </a:p>
         </p:txBody>
       </p:sp>
+      <p:sp>
+        <p:nvSpPr>
+          <p:cNvPr id="11" name="Date Placeholder 3"/>
+          <p:cNvSpPr>
+            <a:spLocks noGrp="1"/>
+          </p:cNvSpPr>
+          <p:nvPr>
+            <p:ph type="dt" sz="half" idx="10"/>
+          </p:nvPr>
+        </p:nvSpPr>
+        <p:spPr>
+          <a:xfrm>
+            <a:off x="6113182" y="4384422"/>
+            <a:ext cx="354882" cy="305233"/>
+          </a:xfrm>
+        </p:spPr>
+        <p:txBody>
+          <a:bodyPr/>
+          <a:lstStyle/>
+          <a:p>
+            <a:fld id="{1E700B27-DE4C-4B9E-BB11-B9027034A00F}" type="datetimeFigureOut">
+              <a:rPr lang="en-US" smtClean="0"/>
+              <a:pPr/>
+              <a:t>12/3/2025</a:t>
+            </a:fld>
+            <a:endParaRPr lang="en-US" dirty="0"/>
+          </a:p>
+        </p:txBody>
+      </p:sp>
       <p:pic>
         <p:nvPicPr>
-          <p:cNvPr id="8" name="Picture 2" descr="PIC18F26Q24"/>
+          <p:cNvPr id="9" name="Picture 4" descr="PIC16F17556 | Microchip Technology"/>
           <p:cNvPicPr>
             <a:picLocks noChangeAspect="1" noChangeArrowheads="1"/>
           </p:cNvPicPr>
@@ -11635,8 +11640,8 @@
         </p:blipFill>
         <p:spPr bwMode="auto">
           <a:xfrm>
-            <a:off x="1907705" y="4116163"/>
-            <a:ext cx="1280738" cy="922132"/>
+            <a:off x="6750880" y="3974993"/>
+            <a:ext cx="2415427" cy="1178257"/>
           </a:xfrm>
           <a:prstGeom prst="rect">
             <a:avLst/>
@@ -11655,7 +11660,7 @@
       </p:pic>
       <p:pic>
         <p:nvPicPr>
-          <p:cNvPr id="10" name="Picture 8" descr="C:\Users\admin\OneDrive\Desktop\Picture1.jpg"/>
+          <p:cNvPr id="12" name="Picture 11" descr="VQFN / 28"/>
           <p:cNvPicPr>
             <a:picLocks noChangeAspect="1" noChangeArrowheads="1"/>
           </p:cNvPicPr>
@@ -11676,8 +11681,8 @@
         </p:blipFill>
         <p:spPr bwMode="auto">
           <a:xfrm>
-            <a:off x="3995936" y="3937587"/>
-            <a:ext cx="2320300" cy="1129258"/>
+            <a:off x="2555776" y="4127004"/>
+            <a:ext cx="1142256" cy="1026246"/>
           </a:xfrm>
           <a:prstGeom prst="rect">
             <a:avLst/>
@@ -11694,35 +11699,6 @@
           </a:extLst>
         </p:spPr>
       </p:pic>
-      <p:sp>
-        <p:nvSpPr>
-          <p:cNvPr id="11" name="Date Placeholder 3"/>
-          <p:cNvSpPr>
-            <a:spLocks noGrp="1"/>
-          </p:cNvSpPr>
-          <p:nvPr>
-            <p:ph type="dt" sz="half" idx="10"/>
-          </p:nvPr>
-        </p:nvSpPr>
-        <p:spPr>
-          <a:xfrm>
-            <a:off x="6113182" y="4384422"/>
-            <a:ext cx="354882" cy="305233"/>
-          </a:xfrm>
-        </p:spPr>
-        <p:txBody>
-          <a:bodyPr/>
-          <a:lstStyle/>
-          <a:p>
-            <a:fld id="{1E700B27-DE4C-4B9E-BB11-B9027034A00F}" type="datetimeFigureOut">
-              <a:rPr lang="en-US" smtClean="0"/>
-              <a:pPr/>
-              <a:t>11/24/2024</a:t>
-            </a:fld>
-            <a:endParaRPr lang="en-US" dirty="0"/>
-          </a:p>
-        </p:txBody>
-      </p:sp>
     </p:spTree>
     <p:extLst>
       <p:ext uri="{BB962C8B-B14F-4D97-AF65-F5344CB8AC3E}">
@@ -11786,7 +11762,7 @@
             <a:pPr algn="l"/>
             <a:r>
               <a:rPr lang="en-GB" dirty="0" smtClean="0"/>
-              <a:t>PIC18FxxQ24</a:t>
+              <a:t>PIC16F175xx</a:t>
             </a:r>
             <a:endParaRPr lang="en-GB" dirty="0"/>
           </a:p>
@@ -11805,71 +11781,120 @@
         <p:spPr/>
         <p:txBody>
           <a:bodyPr>
-            <a:normAutofit fontScale="92500" lnSpcReduction="10000"/>
+            <a:normAutofit fontScale="92500"/>
           </a:bodyPr>
           <a:lstStyle/>
           <a:p>
             <a:r>
               <a:rPr lang="en-GB" dirty="0" smtClean="0"/>
-              <a:t>PIC18-Q24 is a high performance PIC18 </a:t>
+              <a:t>PIC16165xx  is a high performance PIC16</a:t>
             </a:r>
           </a:p>
           <a:p>
             <a:pPr lvl="1"/>
             <a:r>
+              <a:rPr lang="en-GB" b="1" dirty="0"/>
+              <a:t>Digital and </a:t>
+            </a:r>
+            <a:r>
+              <a:rPr lang="en-GB" b="1" dirty="0" err="1"/>
+              <a:t>analog</a:t>
+            </a:r>
+            <a:r>
+              <a:rPr lang="en-GB" b="1" dirty="0"/>
+              <a:t> peripherals</a:t>
+            </a:r>
+            <a:r>
+              <a:rPr lang="en-GB" dirty="0"/>
+              <a:t> for flexible embedded control</a:t>
+            </a:r>
+          </a:p>
+          <a:p>
+            <a:pPr lvl="1"/>
+            <a:r>
+              <a:rPr lang="en-GB" b="1" dirty="0"/>
+              <a:t>10-bit ADC</a:t>
+            </a:r>
+            <a:r>
+              <a:rPr lang="en-GB" dirty="0"/>
+              <a:t> for accurate </a:t>
+            </a:r>
+            <a:r>
+              <a:rPr lang="en-GB" dirty="0" err="1"/>
+              <a:t>analog</a:t>
+            </a:r>
+            <a:r>
+              <a:rPr lang="en-GB" dirty="0"/>
+              <a:t> signal conversion</a:t>
+            </a:r>
+          </a:p>
+          <a:p>
+            <a:pPr lvl="1"/>
+            <a:r>
+              <a:rPr lang="en-GB" b="1" dirty="0"/>
+              <a:t>Multiple communication interfaces</a:t>
+            </a:r>
+            <a:r>
+              <a:rPr lang="en-GB" dirty="0"/>
+              <a:t> including UART (serial), I²C, and SPI</a:t>
+            </a:r>
+          </a:p>
+          <a:p>
+            <a:pPr lvl="1"/>
+            <a:r>
+              <a:rPr lang="en-GB" b="1" dirty="0"/>
+              <a:t>PWM modules</a:t>
+            </a:r>
+            <a:r>
+              <a:rPr lang="en-GB" dirty="0"/>
+              <a:t> with CCP and 16-bit resolution for precise timing and motor control</a:t>
+            </a:r>
+          </a:p>
+          <a:p>
+            <a:pPr lvl="1"/>
+            <a:r>
+              <a:rPr lang="en-GB" b="1" dirty="0"/>
+              <a:t>Configurable Logic Cells (CLCs)</a:t>
+            </a:r>
+            <a:r>
+              <a:rPr lang="en-GB" dirty="0"/>
+              <a:t> for custom hardware-level logic without external components</a:t>
+            </a:r>
+          </a:p>
+          <a:p>
+            <a:pPr lvl="1"/>
+            <a:r>
+              <a:rPr lang="en-GB" b="1" dirty="0"/>
+              <a:t>Integrated op amps</a:t>
+            </a:r>
+            <a:r>
+              <a:rPr lang="en-GB" dirty="0"/>
+              <a:t> for </a:t>
+            </a:r>
+            <a:r>
+              <a:rPr lang="en-GB" dirty="0" err="1"/>
+              <a:t>onboard</a:t>
+            </a:r>
+            <a:r>
+              <a:rPr lang="en-GB" dirty="0"/>
+              <a:t> </a:t>
+            </a:r>
+            <a:r>
+              <a:rPr lang="en-GB" dirty="0" err="1"/>
+              <a:t>analog</a:t>
+            </a:r>
+            <a:r>
+              <a:rPr lang="en-GB" dirty="0"/>
+              <a:t> signal conditioning and amplification</a:t>
+            </a:r>
+          </a:p>
+          <a:p>
+            <a:endParaRPr lang="en-GB" dirty="0" smtClean="0"/>
+          </a:p>
+          <a:p>
+            <a:r>
               <a:rPr lang="en-GB" dirty="0" smtClean="0"/>
-              <a:t>Digital and Analog peripherals </a:t>
-            </a:r>
-          </a:p>
-          <a:p>
-            <a:pPr lvl="1"/>
-            <a:r>
-              <a:rPr lang="en-GB" dirty="0" smtClean="0"/>
-              <a:t>10-bit ADC</a:t>
-            </a:r>
-          </a:p>
-          <a:p>
-            <a:pPr lvl="1"/>
-            <a:r>
-              <a:rPr lang="en-GB" dirty="0" smtClean="0"/>
-              <a:t>Multiple communication interfaces</a:t>
-            </a:r>
-          </a:p>
-          <a:p>
-            <a:pPr lvl="2"/>
-            <a:r>
-              <a:rPr lang="en-GB" dirty="0" smtClean="0"/>
-              <a:t>Serial, I2C and  SPI </a:t>
-            </a:r>
-          </a:p>
-          <a:p>
-            <a:pPr lvl="2"/>
-            <a:r>
-              <a:rPr lang="en-GB" dirty="0" smtClean="0"/>
-              <a:t>PWM – CCP/PWM and 16Bit</a:t>
-            </a:r>
-          </a:p>
-          <a:p>
-            <a:pPr lvl="1"/>
-            <a:r>
-              <a:rPr lang="en-GB" dirty="0" smtClean="0"/>
-              <a:t>Configurable Logic Cells</a:t>
-            </a:r>
-          </a:p>
-          <a:p>
-            <a:pPr lvl="1"/>
-            <a:r>
-              <a:rPr lang="en-GB" dirty="0" smtClean="0"/>
-              <a:t>Multi voltage domains</a:t>
-            </a:r>
-          </a:p>
-          <a:p>
-            <a:endParaRPr lang="en-GB" dirty="0" smtClean="0"/>
-          </a:p>
-          <a:p>
-            <a:r>
-              <a:rPr lang="en-GB" dirty="0" smtClean="0"/>
-              <a:t>The PIC18xxQ24 offers 28, 40 and 48-pin products in small footprint packages to support customers in a wide variety of applications. </a:t>
+              <a:t>The PIC16175xx offers 14, 20, 28, 40 and 44-pin products in small footprint packages to support customers in a wide variety of applications. </a:t>
             </a:r>
           </a:p>
           <a:p>
@@ -11878,6 +11903,11 @@
         </p:txBody>
       </p:sp>
     </p:spTree>
+    <p:extLst>
+      <p:ext uri="{BB962C8B-B14F-4D97-AF65-F5344CB8AC3E}">
+        <p14:creationId xmlns:p14="http://schemas.microsoft.com/office/powerpoint/2010/main" val="1031208329"/>
+      </p:ext>
+    </p:extLst>
   </p:cSld>
   <p:clrMapOvr>
     <a:masterClrMapping/>
@@ -12084,11 +12114,19 @@
             </a:r>
             <a:r>
               <a:rPr lang="en-GB" sz="1100" dirty="0" smtClean="0"/>
-              <a:t>timer0 </a:t>
+              <a:t>timer0:  16bit timer, 8bit </a:t>
             </a:r>
             <a:r>
               <a:rPr lang="en-GB" sz="1100" dirty="0"/>
-              <a:t>overflow, 8bit timer, 16bit timer to flash the LEDs</a:t>
+              <a:t>timer and overflow </a:t>
+            </a:r>
+            <a:r>
+              <a:rPr lang="en-GB" sz="1100" dirty="0" smtClean="0"/>
+              <a:t> to </a:t>
+            </a:r>
+            <a:r>
+              <a:rPr lang="en-GB" sz="1100" dirty="0"/>
+              <a:t>flash the LEDs</a:t>
             </a:r>
           </a:p>
           <a:p>
@@ -12153,7 +12191,15 @@
             </a:pPr>
             <a:r>
               <a:rPr lang="en-GB" sz="1100" dirty="0"/>
-              <a:t>Using PWM, 7  ways,  to dim the LEDS</a:t>
+              <a:t>Using PWM, </a:t>
+            </a:r>
+            <a:r>
+              <a:rPr lang="en-GB" sz="1100" dirty="0" smtClean="0"/>
+              <a:t>many </a:t>
+            </a:r>
+            <a:r>
+              <a:rPr lang="en-GB" sz="1100" dirty="0"/>
+              <a:t>ways,  to dim the LEDS</a:t>
             </a:r>
           </a:p>
           <a:p>
@@ -12314,7 +12360,7 @@
     </p:spTree>
     <p:extLst>
       <p:ext uri="{BB962C8B-B14F-4D97-AF65-F5344CB8AC3E}">
-        <p14:creationId xmlns:p14="http://schemas.microsoft.com/office/powerpoint/2010/main" val="1947865557"/>
+        <p14:creationId xmlns:p14="http://schemas.microsoft.com/office/powerpoint/2010/main" val="680865665"/>
       </p:ext>
     </p:extLst>
   </p:cSld>
@@ -12461,7 +12507,15 @@
           <a:p>
             <a:r>
               <a:rPr lang="en-GB" dirty="0" smtClean="0"/>
-              <a:t>GCBASIC now supports the 18FxxQ24 chip family</a:t>
+              <a:t>GCBASIC now supports the </a:t>
+            </a:r>
+            <a:r>
+              <a:rPr lang="en-GB" dirty="0" smtClean="0"/>
+              <a:t>16F175xx </a:t>
+            </a:r>
+            <a:r>
+              <a:rPr lang="en-GB" dirty="0" smtClean="0"/>
+              <a:t>chip family</a:t>
             </a:r>
             <a:endParaRPr lang="en-GB" dirty="0"/>
           </a:p>
@@ -12582,7 +12636,15 @@
             <a:pPr marL="778521" lvl="1" indent="-478483"/>
             <a:r>
               <a:rPr lang="en-GB" dirty="0" smtClean="0"/>
-              <a:t>Test that you have the 18FxxQ24 attached</a:t>
+              <a:t>Test that you have the </a:t>
+            </a:r>
+            <a:r>
+              <a:rPr lang="en-GB" dirty="0" smtClean="0"/>
+              <a:t>16F175xx </a:t>
+            </a:r>
+            <a:r>
+              <a:rPr lang="en-GB" dirty="0" smtClean="0"/>
+              <a:t>attached</a:t>
             </a:r>
           </a:p>
           <a:p>
@@ -12618,13 +12680,8 @@
             <a:pPr marL="778521" lvl="1" indent="-478483"/>
             <a:r>
               <a:rPr lang="en-GB" dirty="0" smtClean="0"/>
-              <a:t>You have a USB/TTL </a:t>
-            </a:r>
-            <a:r>
-              <a:rPr lang="en-GB" dirty="0" smtClean="0"/>
-              <a:t>converter</a:t>
-            </a:r>
-            <a:endParaRPr lang="en-GB" dirty="0" smtClean="0"/>
+              <a:t>You have a USB/TTL converter</a:t>
+            </a:r>
           </a:p>
         </p:txBody>
       </p:sp>
@@ -12751,7 +12808,7 @@
         <p:spPr>
           <a:xfrm>
             <a:off x="2483768" y="1275606"/>
-            <a:ext cx="4968552" cy="3785652"/>
+            <a:ext cx="4320480" cy="3785652"/>
           </a:xfrm>
           <a:prstGeom prst="rect">
             <a:avLst/>
@@ -12767,64 +12824,12 @@
           <a:lstStyle/>
           <a:p>
             <a:r>
-              <a:rPr lang="en-GB" sz="1200" b="1" dirty="0">
+              <a:rPr lang="en-GB" sz="1200" b="1" dirty="0" smtClean="0">
                 <a:latin typeface="Courier New" panose="02070309020205020404" pitchFamily="49" charset="0"/>
                 <a:cs typeface="Courier New" panose="02070309020205020404" pitchFamily="49" charset="0"/>
               </a:rPr>
               <a:t>    Hardware</a:t>
             </a:r>
-          </a:p>
-          <a:p>
-            <a:r>
-              <a:rPr lang="en-GB" sz="1200" b="1" dirty="0">
-                <a:latin typeface="Courier New" panose="02070309020205020404" pitchFamily="49" charset="0"/>
-                <a:cs typeface="Courier New" panose="02070309020205020404" pitchFamily="49" charset="0"/>
-              </a:rPr>
-              <a:t>    -------------------PORTA----------------</a:t>
-            </a:r>
-          </a:p>
-          <a:p>
-            <a:r>
-              <a:rPr lang="en-GB" sz="1200" b="1" dirty="0">
-                <a:latin typeface="Courier New" panose="02070309020205020404" pitchFamily="49" charset="0"/>
-                <a:cs typeface="Courier New" panose="02070309020205020404" pitchFamily="49" charset="0"/>
-              </a:rPr>
-              <a:t>    Bit#:  -7---6---5---4---3---2---1---0---</a:t>
-            </a:r>
-          </a:p>
-          <a:p>
-            <a:r>
-              <a:rPr lang="en-GB" sz="1200" b="1" dirty="0">
-                <a:latin typeface="Courier New" panose="02070309020205020404" pitchFamily="49" charset="0"/>
-                <a:cs typeface="Courier New" panose="02070309020205020404" pitchFamily="49" charset="0"/>
-              </a:rPr>
-              <a:t>    IO:    </a:t>
-            </a:r>
-            <a:r>
-              <a:rPr lang="en-GB" sz="1200" b="1" dirty="0" smtClean="0">
-                <a:latin typeface="Courier New" panose="02070309020205020404" pitchFamily="49" charset="0"/>
-                <a:cs typeface="Courier New" panose="02070309020205020404" pitchFamily="49" charset="0"/>
-              </a:rPr>
-              <a:t>----------------SW----------ADC-</a:t>
-            </a:r>
-            <a:r>
-              <a:rPr lang="en-GB" sz="1200" b="1" dirty="0">
-                <a:latin typeface="Courier New" panose="02070309020205020404" pitchFamily="49" charset="0"/>
-                <a:cs typeface="Courier New" panose="02070309020205020404" pitchFamily="49" charset="0"/>
-              </a:rPr>
-              <a:t>- </a:t>
-            </a:r>
-          </a:p>
-          <a:p>
-            <a:r>
-              <a:rPr lang="en-GB" sz="1200" b="1" dirty="0">
-                <a:latin typeface="Courier New" panose="02070309020205020404" pitchFamily="49" charset="0"/>
-                <a:cs typeface="Courier New" panose="02070309020205020404" pitchFamily="49" charset="0"/>
-              </a:rPr>
-              <a:t>    ----------------------------------------</a:t>
-            </a:r>
-          </a:p>
-          <a:p>
             <a:r>
               <a:rPr lang="en-GB" sz="1200" b="1" dirty="0">
                 <a:latin typeface="Courier New" panose="02070309020205020404" pitchFamily="49" charset="0"/>
@@ -12843,7 +12848,7 @@
                 <a:latin typeface="Courier New" panose="02070309020205020404" pitchFamily="49" charset="0"/>
                 <a:cs typeface="Courier New" panose="02070309020205020404" pitchFamily="49" charset="0"/>
               </a:rPr>
-              <a:t>    -------------------PORTB----------------</a:t>
+              <a:t>// -------------------PORTA----------------</a:t>
             </a:r>
           </a:p>
           <a:p>
@@ -12852,7 +12857,7 @@
                 <a:latin typeface="Courier New" panose="02070309020205020404" pitchFamily="49" charset="0"/>
                 <a:cs typeface="Courier New" panose="02070309020205020404" pitchFamily="49" charset="0"/>
               </a:rPr>
-              <a:t>    Bit#:  -7---6---5---4---3---2---1---0---</a:t>
+              <a:t>// Bit#:  -7---6---5---4---3---2---1---0---</a:t>
             </a:r>
           </a:p>
           <a:p>
@@ -12861,7 +12866,7 @@
                 <a:latin typeface="Courier New" panose="02070309020205020404" pitchFamily="49" charset="0"/>
                 <a:cs typeface="Courier New" panose="02070309020205020404" pitchFamily="49" charset="0"/>
               </a:rPr>
-              <a:t>    IO:    ----------------LED-LED-LED-LED--</a:t>
+              <a:t>// IO:   -----------------SW----------ADC--</a:t>
             </a:r>
           </a:p>
           <a:p>
@@ -12870,8 +12875,14 @@
                 <a:latin typeface="Courier New" panose="02070309020205020404" pitchFamily="49" charset="0"/>
                 <a:cs typeface="Courier New" panose="02070309020205020404" pitchFamily="49" charset="0"/>
               </a:rPr>
-              <a:t>    ----------------------------------------</a:t>
-            </a:r>
+              <a:t>// ----------------------------------------</a:t>
+            </a:r>
+          </a:p>
+          <a:p>
+            <a:endParaRPr lang="en-GB" sz="1200" b="1" dirty="0">
+              <a:latin typeface="Courier New" panose="02070309020205020404" pitchFamily="49" charset="0"/>
+              <a:cs typeface="Courier New" panose="02070309020205020404" pitchFamily="49" charset="0"/>
+            </a:endParaRPr>
           </a:p>
           <a:p>
             <a:r>
@@ -12879,7 +12890,7 @@
                 <a:latin typeface="Courier New" panose="02070309020205020404" pitchFamily="49" charset="0"/>
                 <a:cs typeface="Courier New" panose="02070309020205020404" pitchFamily="49" charset="0"/>
               </a:rPr>
-              <a:t>    </a:t>
+              <a:t>// -------------------PORTB----------------</a:t>
             </a:r>
           </a:p>
           <a:p>
@@ -12888,7 +12899,7 @@
                 <a:latin typeface="Courier New" panose="02070309020205020404" pitchFamily="49" charset="0"/>
                 <a:cs typeface="Courier New" panose="02070309020205020404" pitchFamily="49" charset="0"/>
               </a:rPr>
-              <a:t>    ------------------PORTC-----------------</a:t>
+              <a:t>// Bit#:  -7---6---5---4---3---2---1---0---</a:t>
             </a:r>
           </a:p>
           <a:p>
@@ -12897,7 +12908,7 @@
                 <a:latin typeface="Courier New" panose="02070309020205020404" pitchFamily="49" charset="0"/>
                 <a:cs typeface="Courier New" panose="02070309020205020404" pitchFamily="49" charset="0"/>
               </a:rPr>
-              <a:t>    Bit#:  -X---6---5---4---3---2---1---0---</a:t>
+              <a:t>// IO:    ---------------------------------</a:t>
             </a:r>
           </a:p>
           <a:p>
@@ -12906,159 +12917,143 @@
                 <a:latin typeface="Courier New" panose="02070309020205020404" pitchFamily="49" charset="0"/>
                 <a:cs typeface="Courier New" panose="02070309020205020404" pitchFamily="49" charset="0"/>
               </a:rPr>
-              <a:t>    IO:    </a:t>
+              <a:t>// ----------------------------------------</a:t>
+            </a:r>
+          </a:p>
+          <a:p>
+            <a:endParaRPr lang="en-GB" sz="1200" b="1" dirty="0">
+              <a:latin typeface="Courier New" panose="02070309020205020404" pitchFamily="49" charset="0"/>
+              <a:cs typeface="Courier New" panose="02070309020205020404" pitchFamily="49" charset="0"/>
+            </a:endParaRPr>
+          </a:p>
+          <a:p>
+            <a:r>
+              <a:rPr lang="en-GB" sz="1200" b="1" dirty="0">
+                <a:latin typeface="Courier New" panose="02070309020205020404" pitchFamily="49" charset="0"/>
+                <a:cs typeface="Courier New" panose="02070309020205020404" pitchFamily="49" charset="0"/>
+              </a:rPr>
+              <a:t>// </a:t>
             </a:r>
             <a:r>
               <a:rPr lang="en-GB" sz="1200" b="1" dirty="0" smtClean="0">
                 <a:latin typeface="Courier New" panose="02070309020205020404" pitchFamily="49" charset="0"/>
                 <a:cs typeface="Courier New" panose="02070309020205020404" pitchFamily="49" charset="0"/>
               </a:rPr>
-              <a:t>-^--TX---------------------------</a:t>
+              <a:t>------------------</a:t>
+            </a:r>
+            <a:r>
+              <a:rPr lang="en-GB" sz="1200" b="1" dirty="0">
+                <a:latin typeface="Courier New" panose="02070309020205020404" pitchFamily="49" charset="0"/>
+                <a:cs typeface="Courier New" panose="02070309020205020404" pitchFamily="49" charset="0"/>
+              </a:rPr>
+              <a:t>PORTC-----------------</a:t>
+            </a:r>
+          </a:p>
+          <a:p>
+            <a:r>
+              <a:rPr lang="en-GB" sz="1200" b="1" dirty="0">
+                <a:latin typeface="Courier New" panose="02070309020205020404" pitchFamily="49" charset="0"/>
+                <a:cs typeface="Courier New" panose="02070309020205020404" pitchFamily="49" charset="0"/>
+              </a:rPr>
+              <a:t>// Bit#:  -7---6---5---4---3---2---1---0---</a:t>
+            </a:r>
+          </a:p>
+          <a:p>
+            <a:r>
+              <a:rPr lang="en-GB" sz="1200" b="1" dirty="0">
+                <a:latin typeface="Courier New" panose="02070309020205020404" pitchFamily="49" charset="0"/>
+                <a:cs typeface="Courier New" panose="02070309020205020404" pitchFamily="49" charset="0"/>
+              </a:rPr>
+              <a:t>// IO:    ----TX1-</a:t>
+            </a:r>
+            <a:r>
+              <a:rPr lang="en-GB" sz="1200" b="1" dirty="0" smtClean="0">
+                <a:latin typeface="Courier New" panose="02070309020205020404" pitchFamily="49" charset="0"/>
+                <a:cs typeface="Courier New" panose="02070309020205020404" pitchFamily="49" charset="0"/>
+              </a:rPr>
+              <a:t>-------LED-</a:t>
+            </a:r>
+            <a:r>
+              <a:rPr lang="en-GB" sz="1200" b="1" dirty="0">
+                <a:latin typeface="Courier New" panose="02070309020205020404" pitchFamily="49" charset="0"/>
+                <a:cs typeface="Courier New" panose="02070309020205020404" pitchFamily="49" charset="0"/>
+              </a:rPr>
+              <a:t>-LED-LED LED--</a:t>
+            </a:r>
+          </a:p>
+          <a:p>
+            <a:r>
+              <a:rPr lang="en-GB" sz="1200" b="1" dirty="0">
+                <a:latin typeface="Courier New" panose="02070309020205020404" pitchFamily="49" charset="0"/>
+                <a:cs typeface="Courier New" panose="02070309020205020404" pitchFamily="49" charset="0"/>
+              </a:rPr>
+              <a:t>// ----------------------------------------</a:t>
+            </a:r>
+          </a:p>
+          <a:p>
+            <a:r>
+              <a:rPr lang="en-GB" sz="1200" b="1" dirty="0">
+                <a:latin typeface="Courier New" panose="02070309020205020404" pitchFamily="49" charset="0"/>
+                <a:cs typeface="Courier New" panose="02070309020205020404" pitchFamily="49" charset="0"/>
+              </a:rPr>
+              <a:t>//</a:t>
+            </a:r>
+          </a:p>
+          <a:p>
+            <a:r>
+              <a:rPr lang="en-GB" sz="1200" b="1" dirty="0">
+                <a:latin typeface="Courier New" panose="02070309020205020404" pitchFamily="49" charset="0"/>
+                <a:cs typeface="Courier New" panose="02070309020205020404" pitchFamily="49" charset="0"/>
+              </a:rPr>
+              <a:t>// ------------------PORTE-----------------</a:t>
+            </a:r>
+          </a:p>
+          <a:p>
+            <a:r>
+              <a:rPr lang="en-GB" sz="1200" b="1" dirty="0">
+                <a:latin typeface="Courier New" panose="02070309020205020404" pitchFamily="49" charset="0"/>
+                <a:cs typeface="Courier New" panose="02070309020205020404" pitchFamily="49" charset="0"/>
+              </a:rPr>
+              <a:t>// Bit#:  -7---6---5---4---3---2---1---0---</a:t>
+            </a:r>
+          </a:p>
+          <a:p>
+            <a:r>
+              <a:rPr lang="en-GB" sz="1200" b="1" dirty="0">
+                <a:latin typeface="Courier New" panose="02070309020205020404" pitchFamily="49" charset="0"/>
+                <a:cs typeface="Courier New" panose="02070309020205020404" pitchFamily="49" charset="0"/>
+              </a:rPr>
+              <a:t>// IO:    ----------------MCLR-------------</a:t>
+            </a:r>
+          </a:p>
+          <a:p>
+            <a:r>
+              <a:rPr lang="en-GB" sz="1200" b="1" dirty="0">
+                <a:latin typeface="Courier New" panose="02070309020205020404" pitchFamily="49" charset="0"/>
+                <a:cs typeface="Courier New" panose="02070309020205020404" pitchFamily="49" charset="0"/>
+              </a:rPr>
+              <a:t>// ------------------------SW-</a:t>
+            </a:r>
+            <a:r>
+              <a:rPr lang="en-GB" sz="1200" b="1" dirty="0" smtClean="0">
+                <a:latin typeface="Courier New" panose="02070309020205020404" pitchFamily="49" charset="0"/>
+                <a:cs typeface="Courier New" panose="02070309020205020404" pitchFamily="49" charset="0"/>
+              </a:rPr>
+              <a:t>-------------</a:t>
             </a:r>
             <a:endParaRPr lang="en-GB" sz="1200" b="1" dirty="0">
               <a:latin typeface="Courier New" panose="02070309020205020404" pitchFamily="49" charset="0"/>
               <a:cs typeface="Courier New" panose="02070309020205020404" pitchFamily="49" charset="0"/>
             </a:endParaRPr>
           </a:p>
-          <a:p>
-            <a:r>
-              <a:rPr lang="en-GB" sz="1200" b="1" dirty="0">
-                <a:latin typeface="Courier New" panose="02070309020205020404" pitchFamily="49" charset="0"/>
-                <a:cs typeface="Courier New" panose="02070309020205020404" pitchFamily="49" charset="0"/>
-              </a:rPr>
-              <a:t>    -----VDDIO2----------------------------- </a:t>
-            </a:r>
-            <a:endParaRPr lang="en-GB" sz="1200" b="1" dirty="0" smtClean="0">
-              <a:latin typeface="Courier New" panose="02070309020205020404" pitchFamily="49" charset="0"/>
-              <a:cs typeface="Courier New" panose="02070309020205020404" pitchFamily="49" charset="0"/>
-            </a:endParaRPr>
-          </a:p>
-          <a:p>
-            <a:r>
-              <a:rPr lang="en-GB" sz="1200" b="1" dirty="0">
-                <a:latin typeface="Courier New" panose="02070309020205020404" pitchFamily="49" charset="0"/>
-                <a:cs typeface="Courier New" panose="02070309020205020404" pitchFamily="49" charset="0"/>
-              </a:rPr>
-              <a:t> </a:t>
-            </a:r>
-            <a:r>
-              <a:rPr lang="en-GB" sz="1200" b="1" dirty="0" smtClean="0">
-                <a:latin typeface="Courier New" panose="02070309020205020404" pitchFamily="49" charset="0"/>
-                <a:cs typeface="Courier New" panose="02070309020205020404" pitchFamily="49" charset="0"/>
-              </a:rPr>
-              <a:t>   You </a:t>
-            </a:r>
-            <a:r>
-              <a:rPr lang="en-GB" sz="1200" b="1" dirty="0">
-                <a:latin typeface="Courier New" panose="02070309020205020404" pitchFamily="49" charset="0"/>
-                <a:cs typeface="Courier New" panose="02070309020205020404" pitchFamily="49" charset="0"/>
-              </a:rPr>
-              <a:t>must apply correct </a:t>
-            </a:r>
-            <a:r>
-              <a:rPr lang="en-GB" sz="1200" b="1" dirty="0" smtClean="0">
-                <a:latin typeface="Courier New" panose="02070309020205020404" pitchFamily="49" charset="0"/>
-                <a:cs typeface="Courier New" panose="02070309020205020404" pitchFamily="49" charset="0"/>
-              </a:rPr>
-              <a:t>Voltage</a:t>
-            </a:r>
-          </a:p>
-          <a:p>
-            <a:r>
-              <a:rPr lang="en-GB" sz="1200" b="1" dirty="0" smtClean="0">
-                <a:latin typeface="Courier New" panose="02070309020205020404" pitchFamily="49" charset="0"/>
-                <a:cs typeface="Courier New" panose="02070309020205020404" pitchFamily="49" charset="0"/>
-              </a:rPr>
-              <a:t> </a:t>
-            </a:r>
-            <a:r>
-              <a:rPr lang="en-GB" sz="1200" b="1" dirty="0">
-                <a:latin typeface="Courier New" panose="02070309020205020404" pitchFamily="49" charset="0"/>
-                <a:cs typeface="Courier New" panose="02070309020205020404" pitchFamily="49" charset="0"/>
-              </a:rPr>
-              <a:t>  </a:t>
-            </a:r>
-          </a:p>
-          <a:p>
-            <a:r>
-              <a:rPr lang="en-GB" sz="1200" b="1" dirty="0">
-                <a:latin typeface="Courier New" panose="02070309020205020404" pitchFamily="49" charset="0"/>
-                <a:cs typeface="Courier New" panose="02070309020205020404" pitchFamily="49" charset="0"/>
-              </a:rPr>
-              <a:t>    ------------------</a:t>
-            </a:r>
-            <a:r>
-              <a:rPr lang="en-GB" sz="1200" b="1" dirty="0" smtClean="0">
-                <a:latin typeface="Courier New" panose="02070309020205020404" pitchFamily="49" charset="0"/>
-                <a:cs typeface="Courier New" panose="02070309020205020404" pitchFamily="49" charset="0"/>
-              </a:rPr>
-              <a:t>PORTE-</a:t>
-            </a:r>
-            <a:r>
-              <a:rPr lang="en-GB" sz="1200" b="1" dirty="0">
-                <a:latin typeface="Courier New" panose="02070309020205020404" pitchFamily="49" charset="0"/>
-                <a:cs typeface="Courier New" panose="02070309020205020404" pitchFamily="49" charset="0"/>
-              </a:rPr>
-              <a:t>----------------</a:t>
-            </a:r>
-          </a:p>
-          <a:p>
-            <a:r>
-              <a:rPr lang="en-GB" sz="1200" b="1" dirty="0">
-                <a:latin typeface="Courier New" panose="02070309020205020404" pitchFamily="49" charset="0"/>
-                <a:cs typeface="Courier New" panose="02070309020205020404" pitchFamily="49" charset="0"/>
-              </a:rPr>
-              <a:t>    Bit#:  </a:t>
-            </a:r>
-            <a:r>
-              <a:rPr lang="en-GB" sz="1200" b="1" dirty="0" smtClean="0">
-                <a:latin typeface="Courier New" panose="02070309020205020404" pitchFamily="49" charset="0"/>
-                <a:cs typeface="Courier New" panose="02070309020205020404" pitchFamily="49" charset="0"/>
-              </a:rPr>
-              <a:t>-----------------</a:t>
-            </a:r>
-            <a:r>
-              <a:rPr lang="en-GB" sz="1200" b="1" dirty="0">
-                <a:latin typeface="Courier New" panose="02070309020205020404" pitchFamily="49" charset="0"/>
-                <a:cs typeface="Courier New" panose="02070309020205020404" pitchFamily="49" charset="0"/>
-              </a:rPr>
-              <a:t>3-</a:t>
-            </a:r>
-            <a:r>
-              <a:rPr lang="en-GB" sz="1200" b="1" dirty="0" smtClean="0">
-                <a:latin typeface="Courier New" panose="02070309020205020404" pitchFamily="49" charset="0"/>
-                <a:cs typeface="Courier New" panose="02070309020205020404" pitchFamily="49" charset="0"/>
-              </a:rPr>
-              <a:t>--------------</a:t>
-            </a:r>
-            <a:endParaRPr lang="en-GB" sz="1200" b="1" dirty="0">
-              <a:latin typeface="Courier New" panose="02070309020205020404" pitchFamily="49" charset="0"/>
-              <a:cs typeface="Courier New" panose="02070309020205020404" pitchFamily="49" charset="0"/>
-            </a:endParaRPr>
-          </a:p>
-          <a:p>
-            <a:r>
-              <a:rPr lang="en-GB" sz="1200" b="1" dirty="0">
-                <a:latin typeface="Courier New" panose="02070309020205020404" pitchFamily="49" charset="0"/>
-                <a:cs typeface="Courier New" panose="02070309020205020404" pitchFamily="49" charset="0"/>
-              </a:rPr>
-              <a:t>    IO:    </a:t>
-            </a:r>
-            <a:r>
-              <a:rPr lang="en-GB" sz="1200" b="1" dirty="0" smtClean="0">
-                <a:latin typeface="Courier New" panose="02070309020205020404" pitchFamily="49" charset="0"/>
-                <a:cs typeface="Courier New" panose="02070309020205020404" pitchFamily="49" charset="0"/>
-              </a:rPr>
-              <a:t>----------------SW---------------</a:t>
-            </a:r>
-            <a:endParaRPr lang="en-GB" sz="1200" b="1" dirty="0">
-              <a:latin typeface="Courier New" panose="02070309020205020404" pitchFamily="49" charset="0"/>
-              <a:cs typeface="Courier New" panose="02070309020205020404" pitchFamily="49" charset="0"/>
-            </a:endParaRPr>
-          </a:p>
         </p:txBody>
       </p:sp>
     </p:spTree>
+    <p:extLst>
+      <p:ext uri="{BB962C8B-B14F-4D97-AF65-F5344CB8AC3E}">
+        <p14:creationId xmlns:p14="http://schemas.microsoft.com/office/powerpoint/2010/main" val="3549850799"/>
+      </p:ext>
+    </p:extLst>
   </p:cSld>
   <p:clrMapOvr>
     <a:masterClrMapping/>
@@ -13082,7 +13077,7 @@
 </file>
 
 <file path=ppt/slides/slide9.xml><?xml version="1.0" encoding="utf-8"?>
-<p:sld xmlns:a="http://schemas.openxmlformats.org/drawingml/2006/main" xmlns:r="http://schemas.openxmlformats.org/officeDocument/2006/relationships" xmlns:p="http://schemas.openxmlformats.org/presentationml/2006/main" show="0">
+<p:sld xmlns:a="http://schemas.openxmlformats.org/drawingml/2006/main" xmlns:r="http://schemas.openxmlformats.org/officeDocument/2006/relationships" xmlns:p="http://schemas.openxmlformats.org/presentationml/2006/main">
   <p:cSld>
     <p:spTree>
       <p:nvGrpSpPr>
@@ -13108,87 +13103,700 @@
             <p:ph type="title"/>
           </p:nvPr>
         </p:nvSpPr>
-        <p:spPr/>
-        <p:txBody>
-          <a:bodyPr/>
+        <p:spPr>
+          <a:xfrm>
+            <a:off x="155575" y="501030"/>
+            <a:ext cx="5400600" cy="990600"/>
+          </a:xfrm>
+        </p:spPr>
+        <p:txBody>
+          <a:bodyPr vert="horz" lIns="85064" tIns="42531" rIns="85064" bIns="42531" rtlCol="0" anchor="t">
+            <a:normAutofit/>
+          </a:bodyPr>
           <a:lstStyle/>
           <a:p>
             <a:r>
-              <a:rPr lang="en-GB" dirty="0" smtClean="0"/>
-              <a:t>Power Domain – VDDIO2</a:t>
-            </a:r>
-            <a:endParaRPr lang="en-GB" dirty="0"/>
-          </a:p>
-        </p:txBody>
-      </p:sp>
-      <p:pic>
-        <p:nvPicPr>
-          <p:cNvPr id="4" name="Picture 2"/>
-          <p:cNvPicPr>
-            <a:picLocks noChangeAspect="1" noChangeArrowheads="1"/>
-          </p:cNvPicPr>
+              <a:rPr lang="en-GB" dirty="0"/>
+              <a:t>Digital input</a:t>
+            </a:r>
+          </a:p>
+        </p:txBody>
+      </p:sp>
+      <p:sp>
+        <p:nvSpPr>
+          <p:cNvPr id="5" name="AutoShape 4" descr="Uploaded image"/>
+          <p:cNvSpPr>
+            <a:spLocks noChangeAspect="1" noChangeArrowheads="1"/>
+          </p:cNvSpPr>
           <p:nvPr/>
-        </p:nvPicPr>
-        <p:blipFill>
-          <a:blip r:embed="rId2">
-            <a:extLst>
-              <a:ext uri="{28A0092B-C50C-407E-A947-70E740481C1C}">
-                <a14:useLocalDpi xmlns:a14="http://schemas.microsoft.com/office/drawing/2010/main" val="0"/>
-              </a:ext>
-            </a:extLst>
-          </a:blip>
-          <a:srcRect/>
-          <a:stretch>
-            <a:fillRect/>
-          </a:stretch>
-        </p:blipFill>
+        </p:nvSpPr>
         <p:spPr bwMode="auto">
           <a:xfrm>
-            <a:off x="2884410" y="1419622"/>
-            <a:ext cx="3973716" cy="3469327"/>
+            <a:off x="155575" y="-144463"/>
+            <a:ext cx="304800" cy="304801"/>
           </a:xfrm>
           <a:prstGeom prst="rect">
             <a:avLst/>
           </a:prstGeom>
           <a:noFill/>
-          <a:ln>
-            <a:noFill/>
-          </a:ln>
-          <a:effectLst/>
           <a:extLst>
             <a:ext uri="{909E8E84-426E-40DD-AFC4-6F175D3DCCD1}">
               <a14:hiddenFill xmlns:a14="http://schemas.microsoft.com/office/drawing/2010/main">
                 <a:solidFill>
-                  <a:schemeClr val="accent1"/>
+                  <a:srgbClr val="FFFFFF"/>
                 </a:solidFill>
               </a14:hiddenFill>
-            </a:ext>
-            <a:ext uri="{91240B29-F687-4F45-9708-019B960494DF}">
-              <a14:hiddenLine xmlns:a14="http://schemas.microsoft.com/office/drawing/2010/main" w="9525">
-                <a:solidFill>
-                  <a:schemeClr val="tx1"/>
-                </a:solidFill>
-                <a:miter lim="800000"/>
-                <a:headEnd/>
-                <a:tailEnd/>
-              </a14:hiddenLine>
-            </a:ext>
-            <a:ext uri="{AF507438-7753-43E0-B8FC-AC1667EBCBE1}">
-              <a14:hiddenEffects xmlns:a14="http://schemas.microsoft.com/office/drawing/2010/main">
-                <a:effectLst>
-                  <a:outerShdw dist="35921" dir="2700000" algn="ctr" rotWithShape="0">
-                    <a:schemeClr val="bg2"/>
-                  </a:outerShdw>
-                </a:effectLst>
-              </a14:hiddenEffects>
             </a:ext>
           </a:extLst>
         </p:spPr>
-      </p:pic>
+        <p:txBody>
+          <a:bodyPr vert="horz" wrap="square" lIns="91440" tIns="45720" rIns="91440" bIns="45720" numCol="1" anchor="t" anchorCtr="0" compatLnSpc="1">
+            <a:prstTxWarp prst="textNoShape">
+              <a:avLst/>
+            </a:prstTxWarp>
+          </a:bodyPr>
+          <a:lstStyle/>
+          <a:p>
+            <a:endParaRPr lang="en-GB"/>
+          </a:p>
+        </p:txBody>
+      </p:sp>
+      <p:sp>
+        <p:nvSpPr>
+          <p:cNvPr id="8" name="AutoShape 6" descr="Uploaded image"/>
+          <p:cNvSpPr>
+            <a:spLocks noChangeAspect="1" noChangeArrowheads="1"/>
+          </p:cNvSpPr>
+          <p:nvPr/>
+        </p:nvSpPr>
+        <p:spPr bwMode="auto">
+          <a:xfrm>
+            <a:off x="307975" y="7937"/>
+            <a:ext cx="304800" cy="304801"/>
+          </a:xfrm>
+          <a:prstGeom prst="rect">
+            <a:avLst/>
+          </a:prstGeom>
+          <a:noFill/>
+          <a:extLst>
+            <a:ext uri="{909E8E84-426E-40DD-AFC4-6F175D3DCCD1}">
+              <a14:hiddenFill xmlns:a14="http://schemas.microsoft.com/office/drawing/2010/main">
+                <a:solidFill>
+                  <a:srgbClr val="FFFFFF"/>
+                </a:solidFill>
+              </a14:hiddenFill>
+            </a:ext>
+          </a:extLst>
+        </p:spPr>
+        <p:txBody>
+          <a:bodyPr vert="horz" wrap="square" lIns="91440" tIns="45720" rIns="91440" bIns="45720" numCol="1" anchor="t" anchorCtr="0" compatLnSpc="1">
+            <a:prstTxWarp prst="textNoShape">
+              <a:avLst/>
+            </a:prstTxWarp>
+          </a:bodyPr>
+          <a:lstStyle/>
+          <a:p>
+            <a:endParaRPr lang="en-GB"/>
+          </a:p>
+        </p:txBody>
+      </p:sp>
+      <p:sp>
+        <p:nvSpPr>
+          <p:cNvPr id="11" name="AutoShape 8" descr="image.png"/>
+          <p:cNvSpPr>
+            <a:spLocks noChangeAspect="1" noChangeArrowheads="1"/>
+          </p:cNvSpPr>
+          <p:nvPr/>
+        </p:nvSpPr>
+        <p:spPr bwMode="auto">
+          <a:xfrm>
+            <a:off x="460375" y="160337"/>
+            <a:ext cx="304800" cy="304801"/>
+          </a:xfrm>
+          <a:prstGeom prst="rect">
+            <a:avLst/>
+          </a:prstGeom>
+          <a:noFill/>
+          <a:extLst>
+            <a:ext uri="{909E8E84-426E-40DD-AFC4-6F175D3DCCD1}">
+              <a14:hiddenFill xmlns:a14="http://schemas.microsoft.com/office/drawing/2010/main">
+                <a:solidFill>
+                  <a:srgbClr val="FFFFFF"/>
+                </a:solidFill>
+              </a14:hiddenFill>
+            </a:ext>
+          </a:extLst>
+        </p:spPr>
+        <p:txBody>
+          <a:bodyPr vert="horz" wrap="square" lIns="91440" tIns="45720" rIns="91440" bIns="45720" numCol="1" anchor="t" anchorCtr="0" compatLnSpc="1">
+            <a:prstTxWarp prst="textNoShape">
+              <a:avLst/>
+            </a:prstTxWarp>
+          </a:bodyPr>
+          <a:lstStyle/>
+          <a:p>
+            <a:endParaRPr lang="en-GB"/>
+          </a:p>
+        </p:txBody>
+      </p:sp>
+      <p:grpSp>
+        <p:nvGrpSpPr>
+          <p:cNvPr id="25" name="Group 24"/>
+          <p:cNvGrpSpPr/>
+          <p:nvPr/>
+        </p:nvGrpSpPr>
+        <p:grpSpPr>
+          <a:xfrm>
+            <a:off x="547911" y="1563638"/>
+            <a:ext cx="4384129" cy="2952328"/>
+            <a:chOff x="1043608" y="1563638"/>
+            <a:chExt cx="4384129" cy="2952328"/>
+          </a:xfrm>
+        </p:grpSpPr>
+        <p:pic>
+          <p:nvPicPr>
+            <p:cNvPr id="1036" name="Picture 12"/>
+            <p:cNvPicPr>
+              <a:picLocks noChangeAspect="1" noChangeArrowheads="1"/>
+            </p:cNvPicPr>
+            <p:nvPr/>
+          </p:nvPicPr>
+          <p:blipFill>
+            <a:blip r:embed="rId2">
+              <a:extLst>
+                <a:ext uri="{28A0092B-C50C-407E-A947-70E740481C1C}">
+                  <a14:useLocalDpi xmlns:a14="http://schemas.microsoft.com/office/drawing/2010/main" val="0"/>
+                </a:ext>
+              </a:extLst>
+            </a:blip>
+            <a:srcRect/>
+            <a:stretch>
+              <a:fillRect/>
+            </a:stretch>
+          </p:blipFill>
+          <p:spPr bwMode="auto">
+            <a:xfrm>
+              <a:off x="1043608" y="1563638"/>
+              <a:ext cx="1476375" cy="2924175"/>
+            </a:xfrm>
+            <a:prstGeom prst="rect">
+              <a:avLst/>
+            </a:prstGeom>
+            <a:noFill/>
+            <a:ln>
+              <a:noFill/>
+            </a:ln>
+            <a:effectLst/>
+            <a:extLst>
+              <a:ext uri="{909E8E84-426E-40DD-AFC4-6F175D3DCCD1}">
+                <a14:hiddenFill xmlns:a14="http://schemas.microsoft.com/office/drawing/2010/main">
+                  <a:solidFill>
+                    <a:schemeClr val="accent1"/>
+                  </a:solidFill>
+                </a14:hiddenFill>
+              </a:ext>
+              <a:ext uri="{91240B29-F687-4F45-9708-019B960494DF}">
+                <a14:hiddenLine xmlns:a14="http://schemas.microsoft.com/office/drawing/2010/main" w="9525">
+                  <a:solidFill>
+                    <a:schemeClr val="tx1"/>
+                  </a:solidFill>
+                  <a:miter lim="800000"/>
+                  <a:headEnd/>
+                  <a:tailEnd/>
+                </a14:hiddenLine>
+              </a:ext>
+              <a:ext uri="{AF507438-7753-43E0-B8FC-AC1667EBCBE1}">
+                <a14:hiddenEffects xmlns:a14="http://schemas.microsoft.com/office/drawing/2010/main">
+                  <a:effectLst>
+                    <a:outerShdw dist="35921" dir="2700000" algn="ctr" rotWithShape="0">
+                      <a:schemeClr val="bg2"/>
+                    </a:outerShdw>
+                  </a:effectLst>
+                </a14:hiddenEffects>
+              </a:ext>
+            </a:extLst>
+          </p:spPr>
+        </p:pic>
+        <p:pic>
+          <p:nvPicPr>
+            <p:cNvPr id="1037" name="Picture 13"/>
+            <p:cNvPicPr>
+              <a:picLocks noChangeAspect="1" noChangeArrowheads="1"/>
+            </p:cNvPicPr>
+            <p:nvPr/>
+          </p:nvPicPr>
+          <p:blipFill>
+            <a:blip r:embed="rId3">
+              <a:extLst>
+                <a:ext uri="{28A0092B-C50C-407E-A947-70E740481C1C}">
+                  <a14:useLocalDpi xmlns:a14="http://schemas.microsoft.com/office/drawing/2010/main" val="0"/>
+                </a:ext>
+              </a:extLst>
+            </a:blip>
+            <a:srcRect/>
+            <a:stretch>
+              <a:fillRect/>
+            </a:stretch>
+          </p:blipFill>
+          <p:spPr bwMode="auto">
+            <a:xfrm>
+              <a:off x="3779912" y="1565118"/>
+              <a:ext cx="1647825" cy="2950848"/>
+            </a:xfrm>
+            <a:prstGeom prst="rect">
+              <a:avLst/>
+            </a:prstGeom>
+            <a:noFill/>
+            <a:ln>
+              <a:noFill/>
+            </a:ln>
+            <a:effectLst/>
+            <a:extLst>
+              <a:ext uri="{909E8E84-426E-40DD-AFC4-6F175D3DCCD1}">
+                <a14:hiddenFill xmlns:a14="http://schemas.microsoft.com/office/drawing/2010/main">
+                  <a:solidFill>
+                    <a:schemeClr val="accent1"/>
+                  </a:solidFill>
+                </a14:hiddenFill>
+              </a:ext>
+              <a:ext uri="{91240B29-F687-4F45-9708-019B960494DF}">
+                <a14:hiddenLine xmlns:a14="http://schemas.microsoft.com/office/drawing/2010/main" w="9525">
+                  <a:solidFill>
+                    <a:schemeClr val="tx1"/>
+                  </a:solidFill>
+                  <a:miter lim="800000"/>
+                  <a:headEnd/>
+                  <a:tailEnd/>
+                </a14:hiddenLine>
+              </a:ext>
+              <a:ext uri="{AF507438-7753-43E0-B8FC-AC1667EBCBE1}">
+                <a14:hiddenEffects xmlns:a14="http://schemas.microsoft.com/office/drawing/2010/main">
+                  <a:effectLst>
+                    <a:outerShdw dist="35921" dir="2700000" algn="ctr" rotWithShape="0">
+                      <a:schemeClr val="bg2"/>
+                    </a:outerShdw>
+                  </a:effectLst>
+                </a14:hiddenEffects>
+              </a:ext>
+            </a:extLst>
+          </p:spPr>
+        </p:pic>
+        <p:sp>
+          <p:nvSpPr>
+            <p:cNvPr id="24" name="Rectangle 23"/>
+            <p:cNvSpPr/>
+            <p:nvPr/>
+          </p:nvSpPr>
+          <p:spPr>
+            <a:xfrm>
+              <a:off x="2555776" y="1563638"/>
+              <a:ext cx="1152128" cy="2894062"/>
+            </a:xfrm>
+            <a:prstGeom prst="rect">
+              <a:avLst/>
+            </a:prstGeom>
+            <a:solidFill>
+              <a:schemeClr val="bg1"/>
+            </a:solidFill>
+          </p:spPr>
+          <p:style>
+            <a:lnRef idx="2">
+              <a:schemeClr val="accent1">
+                <a:shade val="50000"/>
+              </a:schemeClr>
+            </a:lnRef>
+            <a:fillRef idx="1">
+              <a:schemeClr val="accent1"/>
+            </a:fillRef>
+            <a:effectRef idx="0">
+              <a:schemeClr val="accent1"/>
+            </a:effectRef>
+            <a:fontRef idx="minor">
+              <a:schemeClr val="lt1"/>
+            </a:fontRef>
+          </p:style>
+          <p:txBody>
+            <a:bodyPr rtlCol="0" anchor="ctr"/>
+            <a:lstStyle/>
+            <a:p>
+              <a:pPr algn="ctr"/>
+              <a:endParaRPr lang="en-GB" dirty="0"/>
+            </a:p>
+          </p:txBody>
+        </p:sp>
+      </p:grpSp>
+      <p:sp>
+        <p:nvSpPr>
+          <p:cNvPr id="26" name="Rectangle 25"/>
+          <p:cNvSpPr/>
+          <p:nvPr/>
+        </p:nvSpPr>
+        <p:spPr>
+          <a:xfrm>
+            <a:off x="515615" y="1804416"/>
+            <a:ext cx="2120528" cy="180000"/>
+          </a:xfrm>
+          <a:prstGeom prst="rect">
+            <a:avLst/>
+          </a:prstGeom>
+          <a:noFill/>
+          <a:ln w="38100">
+            <a:solidFill>
+              <a:srgbClr val="FF0000"/>
+            </a:solidFill>
+          </a:ln>
+        </p:spPr>
+        <p:style>
+          <a:lnRef idx="2">
+            <a:schemeClr val="accent1">
+              <a:shade val="50000"/>
+            </a:schemeClr>
+          </a:lnRef>
+          <a:fillRef idx="1">
+            <a:schemeClr val="accent1"/>
+          </a:fillRef>
+          <a:effectRef idx="0">
+            <a:schemeClr val="accent1"/>
+          </a:effectRef>
+          <a:fontRef idx="minor">
+            <a:schemeClr val="lt1"/>
+          </a:fontRef>
+        </p:style>
+        <p:txBody>
+          <a:bodyPr rtlCol="0" anchor="ctr"/>
+          <a:lstStyle/>
+          <a:p>
+            <a:pPr algn="r"/>
+            <a:r>
+              <a:rPr lang="en-GB" dirty="0" smtClean="0">
+                <a:solidFill>
+                  <a:schemeClr val="tx1"/>
+                </a:solidFill>
+              </a:rPr>
+              <a:t>ADC</a:t>
+            </a:r>
+            <a:endParaRPr lang="en-GB" dirty="0">
+              <a:solidFill>
+                <a:schemeClr val="tx1"/>
+              </a:solidFill>
+            </a:endParaRPr>
+          </a:p>
+        </p:txBody>
+      </p:sp>
+      <p:sp>
+        <p:nvSpPr>
+          <p:cNvPr id="15" name="Rectangle 14"/>
+          <p:cNvSpPr/>
+          <p:nvPr/>
+        </p:nvSpPr>
+        <p:spPr>
+          <a:xfrm>
+            <a:off x="460375" y="3435846"/>
+            <a:ext cx="2120528" cy="864096"/>
+          </a:xfrm>
+          <a:prstGeom prst="rect">
+            <a:avLst/>
+          </a:prstGeom>
+          <a:noFill/>
+          <a:ln w="38100">
+            <a:solidFill>
+              <a:srgbClr val="FF0000"/>
+            </a:solidFill>
+          </a:ln>
+        </p:spPr>
+        <p:style>
+          <a:lnRef idx="2">
+            <a:schemeClr val="accent1">
+              <a:shade val="50000"/>
+            </a:schemeClr>
+          </a:lnRef>
+          <a:fillRef idx="1">
+            <a:schemeClr val="accent1"/>
+          </a:fillRef>
+          <a:effectRef idx="0">
+            <a:schemeClr val="accent1"/>
+          </a:effectRef>
+          <a:fontRef idx="minor">
+            <a:schemeClr val="lt1"/>
+          </a:fontRef>
+        </p:style>
+        <p:txBody>
+          <a:bodyPr rtlCol="0" anchor="ctr"/>
+          <a:lstStyle/>
+          <a:p>
+            <a:pPr algn="r"/>
+            <a:r>
+              <a:rPr lang="en-GB" dirty="0" smtClean="0">
+                <a:solidFill>
+                  <a:schemeClr val="tx1"/>
+                </a:solidFill>
+              </a:rPr>
+              <a:t>LED</a:t>
+            </a:r>
+            <a:endParaRPr lang="en-GB" dirty="0">
+              <a:solidFill>
+                <a:schemeClr val="tx1"/>
+              </a:solidFill>
+            </a:endParaRPr>
+          </a:p>
+        </p:txBody>
+      </p:sp>
+      <p:sp>
+        <p:nvSpPr>
+          <p:cNvPr id="16" name="Rectangle 15"/>
+          <p:cNvSpPr/>
+          <p:nvPr/>
+        </p:nvSpPr>
+        <p:spPr>
+          <a:xfrm>
+            <a:off x="519448" y="2355726"/>
+            <a:ext cx="2120528" cy="180000"/>
+          </a:xfrm>
+          <a:prstGeom prst="rect">
+            <a:avLst/>
+          </a:prstGeom>
+          <a:noFill/>
+          <a:ln w="38100">
+            <a:solidFill>
+              <a:srgbClr val="FF0000"/>
+            </a:solidFill>
+          </a:ln>
+        </p:spPr>
+        <p:style>
+          <a:lnRef idx="2">
+            <a:schemeClr val="accent1">
+              <a:shade val="50000"/>
+            </a:schemeClr>
+          </a:lnRef>
+          <a:fillRef idx="1">
+            <a:schemeClr val="accent1"/>
+          </a:fillRef>
+          <a:effectRef idx="0">
+            <a:schemeClr val="accent1"/>
+          </a:effectRef>
+          <a:fontRef idx="minor">
+            <a:schemeClr val="lt1"/>
+          </a:fontRef>
+        </p:style>
+        <p:txBody>
+          <a:bodyPr rtlCol="0" anchor="ctr"/>
+          <a:lstStyle/>
+          <a:p>
+            <a:pPr algn="r"/>
+            <a:r>
+              <a:rPr lang="en-GB" dirty="0" smtClean="0">
+                <a:solidFill>
+                  <a:schemeClr val="tx1"/>
+                </a:solidFill>
+              </a:rPr>
+              <a:t>SW</a:t>
+            </a:r>
+            <a:endParaRPr lang="en-GB" dirty="0">
+              <a:solidFill>
+                <a:schemeClr val="tx1"/>
+              </a:solidFill>
+            </a:endParaRPr>
+          </a:p>
+        </p:txBody>
+      </p:sp>
+      <p:sp>
+        <p:nvSpPr>
+          <p:cNvPr id="4" name="Rectangle 3"/>
+          <p:cNvSpPr/>
+          <p:nvPr/>
+        </p:nvSpPr>
+        <p:spPr>
+          <a:xfrm>
+            <a:off x="6732240" y="3651870"/>
+            <a:ext cx="432048" cy="318266"/>
+          </a:xfrm>
+          <a:prstGeom prst="rect">
+            <a:avLst/>
+          </a:prstGeom>
+          <a:solidFill>
+            <a:schemeClr val="bg1"/>
+          </a:solidFill>
+          <a:ln>
+            <a:solidFill>
+              <a:schemeClr val="bg1"/>
+            </a:solidFill>
+          </a:ln>
+        </p:spPr>
+        <p:style>
+          <a:lnRef idx="2">
+            <a:schemeClr val="accent1">
+              <a:shade val="50000"/>
+            </a:schemeClr>
+          </a:lnRef>
+          <a:fillRef idx="1">
+            <a:schemeClr val="accent1"/>
+          </a:fillRef>
+          <a:effectRef idx="0">
+            <a:schemeClr val="accent1"/>
+          </a:effectRef>
+          <a:fontRef idx="minor">
+            <a:schemeClr val="lt1"/>
+          </a:fontRef>
+        </p:style>
+        <p:txBody>
+          <a:bodyPr rtlCol="0" anchor="ctr"/>
+          <a:lstStyle/>
+          <a:p>
+            <a:pPr algn="ctr"/>
+            <a:endParaRPr lang="en-GB"/>
+          </a:p>
+        </p:txBody>
+      </p:sp>
+      <p:cxnSp>
+        <p:nvCxnSpPr>
+          <p:cNvPr id="10" name="Straight Connector 9"/>
+          <p:cNvCxnSpPr/>
+          <p:nvPr/>
+        </p:nvCxnSpPr>
+        <p:spPr>
+          <a:xfrm>
+            <a:off x="6660232" y="3867894"/>
+            <a:ext cx="648072" cy="0"/>
+          </a:xfrm>
+          <a:prstGeom prst="line">
+            <a:avLst/>
+          </a:prstGeom>
+        </p:spPr>
+        <p:style>
+          <a:lnRef idx="1">
+            <a:schemeClr val="accent1"/>
+          </a:lnRef>
+          <a:fillRef idx="0">
+            <a:schemeClr val="accent1"/>
+          </a:fillRef>
+          <a:effectRef idx="0">
+            <a:schemeClr val="accent1"/>
+          </a:effectRef>
+          <a:fontRef idx="minor">
+            <a:schemeClr val="tx1"/>
+          </a:fontRef>
+        </p:style>
+      </p:cxnSp>
+      <p:sp>
+        <p:nvSpPr>
+          <p:cNvPr id="32" name="Rectangle 31"/>
+          <p:cNvSpPr/>
+          <p:nvPr/>
+        </p:nvSpPr>
+        <p:spPr>
+          <a:xfrm>
+            <a:off x="519448" y="1566672"/>
+            <a:ext cx="2120528" cy="200406"/>
+          </a:xfrm>
+          <a:prstGeom prst="rect">
+            <a:avLst/>
+          </a:prstGeom>
+          <a:noFill/>
+          <a:ln w="38100">
+            <a:solidFill>
+              <a:srgbClr val="FF0000"/>
+            </a:solidFill>
+          </a:ln>
+        </p:spPr>
+        <p:style>
+          <a:lnRef idx="2">
+            <a:schemeClr val="accent1">
+              <a:shade val="50000"/>
+            </a:schemeClr>
+          </a:lnRef>
+          <a:fillRef idx="1">
+            <a:schemeClr val="accent1"/>
+          </a:fillRef>
+          <a:effectRef idx="0">
+            <a:schemeClr val="accent1"/>
+          </a:effectRef>
+          <a:fontRef idx="minor">
+            <a:schemeClr val="lt1"/>
+          </a:fontRef>
+        </p:style>
+        <p:txBody>
+          <a:bodyPr rtlCol="0" anchor="ctr"/>
+          <a:lstStyle/>
+          <a:p>
+            <a:pPr algn="r"/>
+            <a:r>
+              <a:rPr lang="en-GB" dirty="0" smtClean="0">
+                <a:solidFill>
+                  <a:schemeClr val="tx1"/>
+                </a:solidFill>
+              </a:rPr>
+              <a:t>SW</a:t>
+            </a:r>
+            <a:endParaRPr lang="en-GB" dirty="0">
+              <a:solidFill>
+                <a:schemeClr val="tx1"/>
+              </a:solidFill>
+            </a:endParaRPr>
+          </a:p>
+        </p:txBody>
+      </p:sp>
+      <p:sp>
+        <p:nvSpPr>
+          <p:cNvPr id="17" name="Rectangle 16"/>
+          <p:cNvSpPr/>
+          <p:nvPr/>
+        </p:nvSpPr>
+        <p:spPr>
+          <a:xfrm>
+            <a:off x="3305320" y="3757806"/>
+            <a:ext cx="2202784" cy="180000"/>
+          </a:xfrm>
+          <a:prstGeom prst="rect">
+            <a:avLst/>
+          </a:prstGeom>
+          <a:noFill/>
+          <a:ln w="38100">
+            <a:solidFill>
+              <a:srgbClr val="FF0000"/>
+            </a:solidFill>
+          </a:ln>
+        </p:spPr>
+        <p:style>
+          <a:lnRef idx="2">
+            <a:schemeClr val="accent1">
+              <a:shade val="50000"/>
+            </a:schemeClr>
+          </a:lnRef>
+          <a:fillRef idx="1">
+            <a:schemeClr val="accent1"/>
+          </a:fillRef>
+          <a:effectRef idx="0">
+            <a:schemeClr val="accent1"/>
+          </a:effectRef>
+          <a:fontRef idx="minor">
+            <a:schemeClr val="lt1"/>
+          </a:fontRef>
+        </p:style>
+        <p:txBody>
+          <a:bodyPr rtlCol="0" anchor="ctr"/>
+          <a:lstStyle/>
+          <a:p>
+            <a:pPr algn="r"/>
+            <a:r>
+              <a:rPr lang="en-GB" dirty="0" smtClean="0">
+                <a:solidFill>
+                  <a:schemeClr val="tx1"/>
+                </a:solidFill>
+              </a:rPr>
+              <a:t>TX1</a:t>
+            </a:r>
+            <a:endParaRPr lang="en-GB" dirty="0">
+              <a:solidFill>
+                <a:schemeClr val="tx1"/>
+              </a:solidFill>
+            </a:endParaRPr>
+          </a:p>
+        </p:txBody>
+      </p:sp>
     </p:spTree>
     <p:extLst>
       <p:ext uri="{BB962C8B-B14F-4D97-AF65-F5344CB8AC3E}">
-        <p14:creationId xmlns:p14="http://schemas.microsoft.com/office/powerpoint/2010/main" val="1947181573"/>
+        <p14:creationId xmlns:p14="http://schemas.microsoft.com/office/powerpoint/2010/main" val="2577495190"/>
       </p:ext>
     </p:extLst>
   </p:cSld>
@@ -13197,10 +13805,10 @@
   </p:clrMapOvr>
   <mc:AlternateContent xmlns:mc="http://schemas.openxmlformats.org/markup-compatibility/2006" xmlns:p14="http://schemas.microsoft.com/office/powerpoint/2010/main">
     <mc:Choice Requires="p14">
-      <p:transition spd="slow" p14:dur="2000"/>
+      <p:transition spd="slow" p14:dur="2000" advClick="0"/>
     </mc:Choice>
     <mc:Fallback xmlns="">
-      <p:transition spd="slow"/>
+      <p:transition spd="slow" advClick="0"/>
     </mc:Fallback>
   </mc:AlternateContent>
   <p:timing>
@@ -13404,7 +14012,7 @@
   <a:extraClrSchemeLst/>
   <a:extLst>
     <a:ext uri="{05A4C25C-085E-4340-85A3-A5531E510DB2}">
-      <thm15:themeFamily xmlns="" xmlns:thm15="http://schemas.microsoft.com/office/thememl/2012/main" name="GCstudioThemeLight" id="{4C740F94-33C0-4EEC-9234-F56C348A0987}" vid="{A43F8B96-90D8-489D-B80F-92F9D6F351CC}"/>
+      <thm15:themeFamily xmlns:thm15="http://schemas.microsoft.com/office/thememl/2012/main" xmlns="" name="GCstudioThemeLight" id="{4C740F94-33C0-4EEC-9234-F56C348A0987}" vid="{A43F8B96-90D8-489D-B80F-92F9D6F351CC}"/>
     </a:ext>
   </a:extLst>
 </a:theme>

</xml_diff>